<commit_message>
Final UML Class Diagram created
</commit_message>
<xml_diff>
--- a/tp_2_stockmate/documentation/TP_2_2_Presentation_StockMate.pptx
+++ b/tp_2_stockmate/documentation/TP_2_2_Presentation_StockMate.pptx
@@ -2,7 +2,7 @@
 <file path=ppt/presentation.xml><?xml version="1.0" encoding="utf-8"?>
 <p:presentation xmlns:a="http://schemas.openxmlformats.org/drawingml/2006/main" xmlns:r="http://schemas.openxmlformats.org/officeDocument/2006/relationships" xmlns:p="http://schemas.openxmlformats.org/presentationml/2006/main" autoCompressPictures="0">
   <p:sldMasterIdLst>
-    <p:sldMasterId id="2147483660" r:id="rId1"/>
+    <p:sldMasterId id="2147483696" r:id="rId1"/>
   </p:sldMasterIdLst>
   <p:sldIdLst>
     <p:sldId id="256" r:id="rId2"/>
@@ -11,9 +11,18 @@
     <p:sldId id="258" r:id="rId5"/>
     <p:sldId id="259" r:id="rId6"/>
     <p:sldId id="264" r:id="rId7"/>
-    <p:sldId id="261" r:id="rId8"/>
-    <p:sldId id="262" r:id="rId9"/>
-    <p:sldId id="260" r:id="rId10"/>
+    <p:sldId id="273" r:id="rId8"/>
+    <p:sldId id="272" r:id="rId9"/>
+    <p:sldId id="274" r:id="rId10"/>
+    <p:sldId id="275" r:id="rId11"/>
+    <p:sldId id="278" r:id="rId12"/>
+    <p:sldId id="276" r:id="rId13"/>
+    <p:sldId id="279" r:id="rId14"/>
+    <p:sldId id="283" r:id="rId15"/>
+    <p:sldId id="284" r:id="rId16"/>
+    <p:sldId id="285" r:id="rId17"/>
+    <p:sldId id="286" r:id="rId18"/>
+    <p:sldId id="266" r:id="rId19"/>
   </p:sldIdLst>
   <p:sldSz cx="12192000" cy="6858000"/>
   <p:notesSz cx="6858000" cy="9144000"/>
@@ -123,233 +132,9 @@
 <file path=ppt/revisionInfo.xml><?xml version="1.0" encoding="utf-8"?>
 <p1510:revInfo xmlns:a="http://schemas.openxmlformats.org/drawingml/2006/main" xmlns:r="http://schemas.openxmlformats.org/officeDocument/2006/relationships" xmlns:p1510="http://schemas.microsoft.com/office/powerpoint/2015/10/main">
   <p1510:revLst>
-    <p1510:client id="{52302321-CB52-479A-B9E1-3E0DD2E21429}" v="150" dt="2019-05-13T20:55:37.112"/>
+    <p1510:client id="{52302321-CB52-479A-B9E1-3E0DD2E21429}" v="1129" dt="2019-05-16T05:41:20.154"/>
   </p1510:revLst>
 </p1510:revInfo>
-</file>
-
-<file path=ppt/changesInfos/changesInfo1.xml><?xml version="1.0" encoding="utf-8"?>
-<pc:chgInfo xmlns:a="http://schemas.openxmlformats.org/drawingml/2006/main" xmlns:r="http://schemas.openxmlformats.org/officeDocument/2006/relationships" xmlns:ac="http://schemas.microsoft.com/office/drawing/2013/main/command" xmlns:pc="http://schemas.microsoft.com/office/powerpoint/2013/main/command">
-  <pc:docChgLst>
-    <pc:chgData name="Hedeen, David" userId="99a532bd-9cc5-4914-9c7f-c4cde6da64b3" providerId="ADAL" clId="{52302321-CB52-479A-B9E1-3E0DD2E21429}"/>
-    <pc:docChg chg="undo custSel mod addSld modSld sldOrd">
-      <pc:chgData name="Hedeen, David" userId="99a532bd-9cc5-4914-9c7f-c4cde6da64b3" providerId="ADAL" clId="{52302321-CB52-479A-B9E1-3E0DD2E21429}" dt="2019-05-13T20:55:37.112" v="149" actId="14100"/>
-      <pc:docMkLst>
-        <pc:docMk/>
-      </pc:docMkLst>
-      <pc:sldChg chg="addSp modSp mod setBg">
-        <pc:chgData name="Hedeen, David" userId="99a532bd-9cc5-4914-9c7f-c4cde6da64b3" providerId="ADAL" clId="{52302321-CB52-479A-B9E1-3E0DD2E21429}" dt="2019-05-13T20:50:11.067" v="86" actId="14100"/>
-        <pc:sldMkLst>
-          <pc:docMk/>
-          <pc:sldMk cId="94367404" sldId="256"/>
-        </pc:sldMkLst>
-        <pc:spChg chg="mod">
-          <ac:chgData name="Hedeen, David" userId="99a532bd-9cc5-4914-9c7f-c4cde6da64b3" providerId="ADAL" clId="{52302321-CB52-479A-B9E1-3E0DD2E21429}" dt="2019-05-13T20:49:41.153" v="76" actId="26606"/>
-          <ac:spMkLst>
-            <pc:docMk/>
-            <pc:sldMk cId="94367404" sldId="256"/>
-            <ac:spMk id="2" creationId="{00000000-0000-0000-0000-000000000000}"/>
-          </ac:spMkLst>
-        </pc:spChg>
-        <pc:spChg chg="mod">
-          <ac:chgData name="Hedeen, David" userId="99a532bd-9cc5-4914-9c7f-c4cde6da64b3" providerId="ADAL" clId="{52302321-CB52-479A-B9E1-3E0DD2E21429}" dt="2019-05-13T20:50:11.067" v="86" actId="14100"/>
-          <ac:spMkLst>
-            <pc:docMk/>
-            <pc:sldMk cId="94367404" sldId="256"/>
-            <ac:spMk id="3" creationId="{00000000-0000-0000-0000-000000000000}"/>
-          </ac:spMkLst>
-        </pc:spChg>
-        <pc:spChg chg="add">
-          <ac:chgData name="Hedeen, David" userId="99a532bd-9cc5-4914-9c7f-c4cde6da64b3" providerId="ADAL" clId="{52302321-CB52-479A-B9E1-3E0DD2E21429}" dt="2019-05-13T20:49:41.153" v="76" actId="26606"/>
-          <ac:spMkLst>
-            <pc:docMk/>
-            <pc:sldMk cId="94367404" sldId="256"/>
-            <ac:spMk id="8" creationId="{E770CA6A-B3B0-4826-A91F-B2B1F8922026}"/>
-          </ac:spMkLst>
-        </pc:spChg>
-        <pc:picChg chg="add">
-          <ac:chgData name="Hedeen, David" userId="99a532bd-9cc5-4914-9c7f-c4cde6da64b3" providerId="ADAL" clId="{52302321-CB52-479A-B9E1-3E0DD2E21429}" dt="2019-05-13T20:49:41.153" v="76" actId="26606"/>
-          <ac:picMkLst>
-            <pc:docMk/>
-            <pc:sldMk cId="94367404" sldId="256"/>
-            <ac:picMk id="10" creationId="{3C51B9DA-B0CC-480A-8EA5-4D5C3E0515B9}"/>
-          </ac:picMkLst>
-        </pc:picChg>
-        <pc:cxnChg chg="add">
-          <ac:chgData name="Hedeen, David" userId="99a532bd-9cc5-4914-9c7f-c4cde6da64b3" providerId="ADAL" clId="{52302321-CB52-479A-B9E1-3E0DD2E21429}" dt="2019-05-13T20:49:41.153" v="76" actId="26606"/>
-          <ac:cxnSpMkLst>
-            <pc:docMk/>
-            <pc:sldMk cId="94367404" sldId="256"/>
-            <ac:cxnSpMk id="12" creationId="{6FE641DB-A503-41DE-ACA6-36B41C6C2BE9}"/>
-          </ac:cxnSpMkLst>
-        </pc:cxnChg>
-      </pc:sldChg>
-      <pc:sldChg chg="modSp modAnim">
-        <pc:chgData name="Hedeen, David" userId="99a532bd-9cc5-4914-9c7f-c4cde6da64b3" providerId="ADAL" clId="{52302321-CB52-479A-B9E1-3E0DD2E21429}" dt="2019-05-13T20:50:44.153" v="91"/>
-        <pc:sldMkLst>
-          <pc:docMk/>
-          <pc:sldMk cId="3434586026" sldId="257"/>
-        </pc:sldMkLst>
-        <pc:spChg chg="mod">
-          <ac:chgData name="Hedeen, David" userId="99a532bd-9cc5-4914-9c7f-c4cde6da64b3" providerId="ADAL" clId="{52302321-CB52-479A-B9E1-3E0DD2E21429}" dt="2019-05-13T20:50:20.164" v="89" actId="27636"/>
-          <ac:spMkLst>
-            <pc:docMk/>
-            <pc:sldMk cId="3434586026" sldId="257"/>
-            <ac:spMk id="3" creationId="{00000000-0000-0000-0000-000000000000}"/>
-          </ac:spMkLst>
-        </pc:spChg>
-      </pc:sldChg>
-      <pc:sldChg chg="modSp">
-        <pc:chgData name="Hedeen, David" userId="99a532bd-9cc5-4914-9c7f-c4cde6da64b3" providerId="ADAL" clId="{52302321-CB52-479A-B9E1-3E0DD2E21429}" dt="2019-05-13T20:52:05.813" v="110" actId="404"/>
-        <pc:sldMkLst>
-          <pc:docMk/>
-          <pc:sldMk cId="3782385883" sldId="259"/>
-        </pc:sldMkLst>
-        <pc:spChg chg="mod">
-          <ac:chgData name="Hedeen, David" userId="99a532bd-9cc5-4914-9c7f-c4cde6da64b3" providerId="ADAL" clId="{52302321-CB52-479A-B9E1-3E0DD2E21429}" dt="2019-05-13T20:52:05.813" v="110" actId="404"/>
-          <ac:spMkLst>
-            <pc:docMk/>
-            <pc:sldMk cId="3782385883" sldId="259"/>
-            <ac:spMk id="2" creationId="{00000000-0000-0000-0000-000000000000}"/>
-          </ac:spMkLst>
-        </pc:spChg>
-        <pc:picChg chg="mod">
-          <ac:chgData name="Hedeen, David" userId="99a532bd-9cc5-4914-9c7f-c4cde6da64b3" providerId="ADAL" clId="{52302321-CB52-479A-B9E1-3E0DD2E21429}" dt="2019-05-13T20:51:36.762" v="103" actId="14100"/>
-          <ac:picMkLst>
-            <pc:docMk/>
-            <pc:sldMk cId="3782385883" sldId="259"/>
-            <ac:picMk id="4" creationId="{00000000-0000-0000-0000-000000000000}"/>
-          </ac:picMkLst>
-        </pc:picChg>
-      </pc:sldChg>
-      <pc:sldChg chg="addSp delSp modSp">
-        <pc:chgData name="Hedeen, David" userId="99a532bd-9cc5-4914-9c7f-c4cde6da64b3" providerId="ADAL" clId="{52302321-CB52-479A-B9E1-3E0DD2E21429}" dt="2019-05-13T20:53:32.625" v="120" actId="1076"/>
-        <pc:sldMkLst>
-          <pc:docMk/>
-          <pc:sldMk cId="3884952505" sldId="260"/>
-        </pc:sldMkLst>
-        <pc:spChg chg="del">
-          <ac:chgData name="Hedeen, David" userId="99a532bd-9cc5-4914-9c7f-c4cde6da64b3" providerId="ADAL" clId="{52302321-CB52-479A-B9E1-3E0DD2E21429}" dt="2019-05-13T20:52:33.901" v="111" actId="931"/>
-          <ac:spMkLst>
-            <pc:docMk/>
-            <pc:sldMk cId="3884952505" sldId="260"/>
-            <ac:spMk id="3" creationId="{00000000-0000-0000-0000-000000000000}"/>
-          </ac:spMkLst>
-        </pc:spChg>
-        <pc:picChg chg="add mod">
-          <ac:chgData name="Hedeen, David" userId="99a532bd-9cc5-4914-9c7f-c4cde6da64b3" providerId="ADAL" clId="{52302321-CB52-479A-B9E1-3E0DD2E21429}" dt="2019-05-13T20:53:32.625" v="120" actId="1076"/>
-          <ac:picMkLst>
-            <pc:docMk/>
-            <pc:sldMk cId="3884952505" sldId="260"/>
-            <ac:picMk id="5" creationId="{463BBECE-63EA-4E92-A624-A30212038ED6}"/>
-          </ac:picMkLst>
-        </pc:picChg>
-      </pc:sldChg>
-      <pc:sldChg chg="modSp modAnim">
-        <pc:chgData name="Hedeen, David" userId="99a532bd-9cc5-4914-9c7f-c4cde6da64b3" providerId="ADAL" clId="{52302321-CB52-479A-B9E1-3E0DD2E21429}" dt="2019-05-13T20:51:14.200" v="101"/>
-        <pc:sldMkLst>
-          <pc:docMk/>
-          <pc:sldMk cId="2610278436" sldId="263"/>
-        </pc:sldMkLst>
-        <pc:spChg chg="mod">
-          <ac:chgData name="Hedeen, David" userId="99a532bd-9cc5-4914-9c7f-c4cde6da64b3" providerId="ADAL" clId="{52302321-CB52-479A-B9E1-3E0DD2E21429}" dt="2019-05-13T20:51:06.437" v="100" actId="403"/>
-          <ac:spMkLst>
-            <pc:docMk/>
-            <pc:sldMk cId="2610278436" sldId="263"/>
-            <ac:spMk id="2" creationId="{3A4ABA54-1A16-4C15-98BB-3908F5E824FA}"/>
-          </ac:spMkLst>
-        </pc:spChg>
-        <pc:spChg chg="mod">
-          <ac:chgData name="Hedeen, David" userId="99a532bd-9cc5-4914-9c7f-c4cde6da64b3" providerId="ADAL" clId="{52302321-CB52-479A-B9E1-3E0DD2E21429}" dt="2019-05-13T20:50:58.048" v="94" actId="403"/>
-          <ac:spMkLst>
-            <pc:docMk/>
-            <pc:sldMk cId="2610278436" sldId="263"/>
-            <ac:spMk id="3" creationId="{BD7350F1-45DD-4C82-BFE6-A75700F041CC}"/>
-          </ac:spMkLst>
-        </pc:spChg>
-      </pc:sldChg>
-      <pc:sldChg chg="addSp delSp modSp add mod ord setBg setClrOvrMap">
-        <pc:chgData name="Hedeen, David" userId="99a532bd-9cc5-4914-9c7f-c4cde6da64b3" providerId="ADAL" clId="{52302321-CB52-479A-B9E1-3E0DD2E21429}" dt="2019-05-13T20:55:37.112" v="149" actId="14100"/>
-        <pc:sldMkLst>
-          <pc:docMk/>
-          <pc:sldMk cId="945113992" sldId="264"/>
-        </pc:sldMkLst>
-        <pc:spChg chg="mod">
-          <ac:chgData name="Hedeen, David" userId="99a532bd-9cc5-4914-9c7f-c4cde6da64b3" providerId="ADAL" clId="{52302321-CB52-479A-B9E1-3E0DD2E21429}" dt="2019-05-13T20:55:37.112" v="149" actId="14100"/>
-          <ac:spMkLst>
-            <pc:docMk/>
-            <pc:sldMk cId="945113992" sldId="264"/>
-            <ac:spMk id="2" creationId="{E9E2039E-AF91-4088-9859-E2B238638AA8}"/>
-          </ac:spMkLst>
-        </pc:spChg>
-        <pc:spChg chg="del">
-          <ac:chgData name="Hedeen, David" userId="99a532bd-9cc5-4914-9c7f-c4cde6da64b3" providerId="ADAL" clId="{52302321-CB52-479A-B9E1-3E0DD2E21429}" dt="2019-05-13T20:54:56.988" v="139" actId="931"/>
-          <ac:spMkLst>
-            <pc:docMk/>
-            <pc:sldMk cId="945113992" sldId="264"/>
-            <ac:spMk id="3" creationId="{AEC3C0F0-C010-4A6C-9961-781D87F40AA4}"/>
-          </ac:spMkLst>
-        </pc:spChg>
-        <pc:spChg chg="add del">
-          <ac:chgData name="Hedeen, David" userId="99a532bd-9cc5-4914-9c7f-c4cde6da64b3" providerId="ADAL" clId="{52302321-CB52-479A-B9E1-3E0DD2E21429}" dt="2019-05-13T20:55:26.170" v="145" actId="478"/>
-          <ac:spMkLst>
-            <pc:docMk/>
-            <pc:sldMk cId="945113992" sldId="264"/>
-            <ac:spMk id="10" creationId="{9BAEFB54-51C6-4156-BE7A-02E297990522}"/>
-          </ac:spMkLst>
-        </pc:spChg>
-        <pc:spChg chg="add">
-          <ac:chgData name="Hedeen, David" userId="99a532bd-9cc5-4914-9c7f-c4cde6da64b3" providerId="ADAL" clId="{52302321-CB52-479A-B9E1-3E0DD2E21429}" dt="2019-05-13T20:55:19.158" v="143" actId="26606"/>
-          <ac:spMkLst>
-            <pc:docMk/>
-            <pc:sldMk cId="945113992" sldId="264"/>
-            <ac:spMk id="13" creationId="{1FDFF85F-F105-40D5-9793-90419158C3BD}"/>
-          </ac:spMkLst>
-        </pc:spChg>
-        <pc:spChg chg="add">
-          <ac:chgData name="Hedeen, David" userId="99a532bd-9cc5-4914-9c7f-c4cde6da64b3" providerId="ADAL" clId="{52302321-CB52-479A-B9E1-3E0DD2E21429}" dt="2019-05-13T20:55:19.158" v="143" actId="26606"/>
-          <ac:spMkLst>
-            <pc:docMk/>
-            <pc:sldMk cId="945113992" sldId="264"/>
-            <ac:spMk id="15" creationId="{35AB47A4-BA8C-4250-88BD-D49C68C5F9E9}"/>
-          </ac:spMkLst>
-        </pc:spChg>
-        <pc:picChg chg="add del mod">
-          <ac:chgData name="Hedeen, David" userId="99a532bd-9cc5-4914-9c7f-c4cde6da64b3" providerId="ADAL" clId="{52302321-CB52-479A-B9E1-3E0DD2E21429}" dt="2019-05-13T20:55:19.158" v="143" actId="26606"/>
-          <ac:picMkLst>
-            <pc:docMk/>
-            <pc:sldMk cId="945113992" sldId="264"/>
-            <ac:picMk id="5" creationId="{B9DBB4AF-CFD8-4FF6-8E73-CEE4A7FD8B10}"/>
-          </ac:picMkLst>
-        </pc:picChg>
-        <pc:picChg chg="add mod">
-          <ac:chgData name="Hedeen, David" userId="99a532bd-9cc5-4914-9c7f-c4cde6da64b3" providerId="ADAL" clId="{52302321-CB52-479A-B9E1-3E0DD2E21429}" dt="2019-05-13T20:55:30.440" v="146" actId="14100"/>
-          <ac:picMkLst>
-            <pc:docMk/>
-            <pc:sldMk cId="945113992" sldId="264"/>
-            <ac:picMk id="8" creationId="{B9DBB4AF-CFD8-4FF6-8E73-CEE4A7FD8B10}"/>
-          </ac:picMkLst>
-        </pc:picChg>
-        <pc:picChg chg="add">
-          <ac:chgData name="Hedeen, David" userId="99a532bd-9cc5-4914-9c7f-c4cde6da64b3" providerId="ADAL" clId="{52302321-CB52-479A-B9E1-3E0DD2E21429}" dt="2019-05-13T20:55:19.158" v="143" actId="26606"/>
-          <ac:picMkLst>
-            <pc:docMk/>
-            <pc:sldMk cId="945113992" sldId="264"/>
-            <ac:picMk id="17" creationId="{66C8958D-EB99-414F-B735-863B67BB14D3}"/>
-          </ac:picMkLst>
-        </pc:picChg>
-        <pc:picChg chg="add">
-          <ac:chgData name="Hedeen, David" userId="99a532bd-9cc5-4914-9c7f-c4cde6da64b3" providerId="ADAL" clId="{52302321-CB52-479A-B9E1-3E0DD2E21429}" dt="2019-05-13T20:55:19.158" v="143" actId="26606"/>
-          <ac:picMkLst>
-            <pc:docMk/>
-            <pc:sldMk cId="945113992" sldId="264"/>
-            <ac:picMk id="19" creationId="{39E5F3CB-7BDD-4E64-B274-CD900F08C6F3}"/>
-          </ac:picMkLst>
-        </pc:picChg>
-      </pc:sldChg>
-    </pc:docChg>
-  </pc:docChgLst>
-</pc:chgInfo>
 </file>
 
 <file path=ppt/slideLayouts/slideLayout1.xml><?xml version="1.0" encoding="utf-8"?>
@@ -523,7 +308,7 @@
             <a:fld id="{B61BEF0D-F0BB-DE4B-95CE-6DB70DBA9567}" type="datetimeFigureOut">
               <a:rPr lang="en-US" smtClean="0"/>
               <a:pPr/>
-              <a:t>5/13/2019</a:t>
+              <a:t>5/16/2019</a:t>
             </a:fld>
             <a:endParaRPr lang="en-US" dirty="0"/>
           </a:p>
@@ -585,7 +370,7 @@
     </p:spTree>
     <p:extLst>
       <p:ext uri="{BB962C8B-B14F-4D97-AF65-F5344CB8AC3E}">
-        <p14:creationId xmlns:p14="http://schemas.microsoft.com/office/powerpoint/2010/main" val="1686806269"/>
+        <p14:creationId xmlns:p14="http://schemas.microsoft.com/office/powerpoint/2010/main" val="4071970958"/>
       </p:ext>
     </p:extLst>
   </p:cSld>
@@ -792,7 +577,7 @@
             <a:fld id="{B61BEF0D-F0BB-DE4B-95CE-6DB70DBA9567}" type="datetimeFigureOut">
               <a:rPr lang="en-US" smtClean="0"/>
               <a:pPr/>
-              <a:t>5/13/2019</a:t>
+              <a:t>5/16/2019</a:t>
             </a:fld>
             <a:endParaRPr lang="en-US" dirty="0"/>
           </a:p>
@@ -844,7 +629,7 @@
     </p:spTree>
     <p:extLst>
       <p:ext uri="{BB962C8B-B14F-4D97-AF65-F5344CB8AC3E}">
-        <p14:creationId xmlns:p14="http://schemas.microsoft.com/office/powerpoint/2010/main" val="317821992"/>
+        <p14:creationId xmlns:p14="http://schemas.microsoft.com/office/powerpoint/2010/main" val="2915885571"/>
       </p:ext>
     </p:extLst>
   </p:cSld>
@@ -1025,7 +810,7 @@
             <a:fld id="{B61BEF0D-F0BB-DE4B-95CE-6DB70DBA9567}" type="datetimeFigureOut">
               <a:rPr lang="en-US" smtClean="0"/>
               <a:pPr/>
-              <a:t>5/13/2019</a:t>
+              <a:t>5/16/2019</a:t>
             </a:fld>
             <a:endParaRPr lang="en-US" dirty="0"/>
           </a:p>
@@ -1087,7 +872,7 @@
     </p:spTree>
     <p:extLst>
       <p:ext uri="{BB962C8B-B14F-4D97-AF65-F5344CB8AC3E}">
-        <p14:creationId xmlns:p14="http://schemas.microsoft.com/office/powerpoint/2010/main" val="331612351"/>
+        <p14:creationId xmlns:p14="http://schemas.microsoft.com/office/powerpoint/2010/main" val="2050144187"/>
       </p:ext>
     </p:extLst>
   </p:cSld>
@@ -1337,7 +1122,7 @@
             <a:fld id="{B61BEF0D-F0BB-DE4B-95CE-6DB70DBA9567}" type="datetimeFigureOut">
               <a:rPr lang="en-US" smtClean="0"/>
               <a:pPr/>
-              <a:t>5/13/2019</a:t>
+              <a:t>5/16/2019</a:t>
             </a:fld>
             <a:endParaRPr lang="en-US" dirty="0"/>
           </a:p>
@@ -1631,7 +1416,7 @@
     </p:spTree>
     <p:extLst>
       <p:ext uri="{BB962C8B-B14F-4D97-AF65-F5344CB8AC3E}">
-        <p14:creationId xmlns:p14="http://schemas.microsoft.com/office/powerpoint/2010/main" val="2496738943"/>
+        <p14:creationId xmlns:p14="http://schemas.microsoft.com/office/powerpoint/2010/main" val="3932118801"/>
       </p:ext>
     </p:extLst>
   </p:cSld>
@@ -1812,7 +1597,7 @@
             <a:fld id="{B61BEF0D-F0BB-DE4B-95CE-6DB70DBA9567}" type="datetimeFigureOut">
               <a:rPr lang="en-US" smtClean="0"/>
               <a:pPr/>
-              <a:t>5/13/2019</a:t>
+              <a:t>5/16/2019</a:t>
             </a:fld>
             <a:endParaRPr lang="en-US" dirty="0"/>
           </a:p>
@@ -1874,7 +1659,7 @@
     </p:spTree>
     <p:extLst>
       <p:ext uri="{BB962C8B-B14F-4D97-AF65-F5344CB8AC3E}">
-        <p14:creationId xmlns:p14="http://schemas.microsoft.com/office/powerpoint/2010/main" val="2676794897"/>
+        <p14:creationId xmlns:p14="http://schemas.microsoft.com/office/powerpoint/2010/main" val="2349235566"/>
       </p:ext>
     </p:extLst>
   </p:cSld>
@@ -2361,7 +2146,7 @@
             <a:fld id="{B61BEF0D-F0BB-DE4B-95CE-6DB70DBA9567}" type="datetimeFigureOut">
               <a:rPr lang="en-US" smtClean="0"/>
               <a:pPr/>
-              <a:t>5/13/2019</a:t>
+              <a:t>5/16/2019</a:t>
             </a:fld>
             <a:endParaRPr lang="en-US" dirty="0"/>
           </a:p>
@@ -2413,7 +2198,7 @@
     </p:spTree>
     <p:extLst>
       <p:ext uri="{BB962C8B-B14F-4D97-AF65-F5344CB8AC3E}">
-        <p14:creationId xmlns:p14="http://schemas.microsoft.com/office/powerpoint/2010/main" val="2934208697"/>
+        <p14:creationId xmlns:p14="http://schemas.microsoft.com/office/powerpoint/2010/main" val="3986377580"/>
       </p:ext>
     </p:extLst>
   </p:cSld>
@@ -3137,7 +2922,7 @@
             <a:fld id="{B61BEF0D-F0BB-DE4B-95CE-6DB70DBA9567}" type="datetimeFigureOut">
               <a:rPr lang="en-US" smtClean="0"/>
               <a:pPr/>
-              <a:t>5/13/2019</a:t>
+              <a:t>5/16/2019</a:t>
             </a:fld>
             <a:endParaRPr lang="en-US" dirty="0"/>
           </a:p>
@@ -3189,7 +2974,7 @@
     </p:spTree>
     <p:extLst>
       <p:ext uri="{BB962C8B-B14F-4D97-AF65-F5344CB8AC3E}">
-        <p14:creationId xmlns:p14="http://schemas.microsoft.com/office/powerpoint/2010/main" val="804794384"/>
+        <p14:creationId xmlns:p14="http://schemas.microsoft.com/office/powerpoint/2010/main" val="3909317054"/>
       </p:ext>
     </p:extLst>
   </p:cSld>
@@ -3314,7 +3099,7 @@
             <a:fld id="{B61BEF0D-F0BB-DE4B-95CE-6DB70DBA9567}" type="datetimeFigureOut">
               <a:rPr lang="en-US" smtClean="0"/>
               <a:pPr/>
-              <a:t>5/13/2019</a:t>
+              <a:t>5/16/2019</a:t>
             </a:fld>
             <a:endParaRPr lang="en-US" dirty="0"/>
           </a:p>
@@ -3366,7 +3151,7 @@
     </p:spTree>
     <p:extLst>
       <p:ext uri="{BB962C8B-B14F-4D97-AF65-F5344CB8AC3E}">
-        <p14:creationId xmlns:p14="http://schemas.microsoft.com/office/powerpoint/2010/main" val="3689242390"/>
+        <p14:creationId xmlns:p14="http://schemas.microsoft.com/office/powerpoint/2010/main" val="3951999653"/>
       </p:ext>
     </p:extLst>
   </p:cSld>
@@ -3539,7 +3324,7 @@
             <a:fld id="{B61BEF0D-F0BB-DE4B-95CE-6DB70DBA9567}" type="datetimeFigureOut">
               <a:rPr lang="en-US" smtClean="0"/>
               <a:pPr/>
-              <a:t>5/13/2019</a:t>
+              <a:t>5/16/2019</a:t>
             </a:fld>
             <a:endParaRPr lang="en-US" dirty="0"/>
           </a:p>
@@ -3601,7 +3386,7 @@
     </p:spTree>
     <p:extLst>
       <p:ext uri="{BB962C8B-B14F-4D97-AF65-F5344CB8AC3E}">
-        <p14:creationId xmlns:p14="http://schemas.microsoft.com/office/powerpoint/2010/main" val="1305478929"/>
+        <p14:creationId xmlns:p14="http://schemas.microsoft.com/office/powerpoint/2010/main" val="4049506599"/>
       </p:ext>
     </p:extLst>
   </p:cSld>
@@ -3721,7 +3506,7 @@
             <a:fld id="{B61BEF0D-F0BB-DE4B-95CE-6DB70DBA9567}" type="datetimeFigureOut">
               <a:rPr lang="en-US" smtClean="0"/>
               <a:pPr/>
-              <a:t>5/13/2019</a:t>
+              <a:t>5/16/2019</a:t>
             </a:fld>
             <a:endParaRPr lang="en-US" dirty="0"/>
           </a:p>
@@ -3773,7 +3558,7 @@
     </p:spTree>
     <p:extLst>
       <p:ext uri="{BB962C8B-B14F-4D97-AF65-F5344CB8AC3E}">
-        <p14:creationId xmlns:p14="http://schemas.microsoft.com/office/powerpoint/2010/main" val="4127398656"/>
+        <p14:creationId xmlns:p14="http://schemas.microsoft.com/office/powerpoint/2010/main" val="2118516420"/>
       </p:ext>
     </p:extLst>
   </p:cSld>
@@ -4012,7 +3797,7 @@
             <a:fld id="{B61BEF0D-F0BB-DE4B-95CE-6DB70DBA9567}" type="datetimeFigureOut">
               <a:rPr lang="en-US" smtClean="0"/>
               <a:pPr/>
-              <a:t>5/13/2019</a:t>
+              <a:t>5/16/2019</a:t>
             </a:fld>
             <a:endParaRPr lang="en-US" dirty="0"/>
           </a:p>
@@ -4074,7 +3859,7 @@
     </p:spTree>
     <p:extLst>
       <p:ext uri="{BB962C8B-B14F-4D97-AF65-F5344CB8AC3E}">
-        <p14:creationId xmlns:p14="http://schemas.microsoft.com/office/powerpoint/2010/main" val="2561194423"/>
+        <p14:creationId xmlns:p14="http://schemas.microsoft.com/office/powerpoint/2010/main" val="3122700032"/>
       </p:ext>
     </p:extLst>
   </p:cSld>
@@ -4256,7 +4041,7 @@
             <a:fld id="{B61BEF0D-F0BB-DE4B-95CE-6DB70DBA9567}" type="datetimeFigureOut">
               <a:rPr lang="en-US" smtClean="0"/>
               <a:pPr/>
-              <a:t>5/13/2019</a:t>
+              <a:t>5/16/2019</a:t>
             </a:fld>
             <a:endParaRPr lang="en-US" dirty="0"/>
           </a:p>
@@ -4308,7 +4093,7 @@
     </p:spTree>
     <p:extLst>
       <p:ext uri="{BB962C8B-B14F-4D97-AF65-F5344CB8AC3E}">
-        <p14:creationId xmlns:p14="http://schemas.microsoft.com/office/powerpoint/2010/main" val="3327412653"/>
+        <p14:creationId xmlns:p14="http://schemas.microsoft.com/office/powerpoint/2010/main" val="4012798790"/>
       </p:ext>
     </p:extLst>
   </p:cSld>
@@ -4637,7 +4422,7 @@
             <a:fld id="{B61BEF0D-F0BB-DE4B-95CE-6DB70DBA9567}" type="datetimeFigureOut">
               <a:rPr lang="en-US" smtClean="0"/>
               <a:pPr/>
-              <a:t>5/13/2019</a:t>
+              <a:t>5/16/2019</a:t>
             </a:fld>
             <a:endParaRPr lang="en-US" dirty="0"/>
           </a:p>
@@ -4689,7 +4474,7 @@
     </p:spTree>
     <p:extLst>
       <p:ext uri="{BB962C8B-B14F-4D97-AF65-F5344CB8AC3E}">
-        <p14:creationId xmlns:p14="http://schemas.microsoft.com/office/powerpoint/2010/main" val="4095539051"/>
+        <p14:creationId xmlns:p14="http://schemas.microsoft.com/office/powerpoint/2010/main" val="3226229288"/>
       </p:ext>
     </p:extLst>
   </p:cSld>
@@ -4757,7 +4542,7 @@
             <a:fld id="{B61BEF0D-F0BB-DE4B-95CE-6DB70DBA9567}" type="datetimeFigureOut">
               <a:rPr lang="en-US" smtClean="0"/>
               <a:pPr/>
-              <a:t>5/13/2019</a:t>
+              <a:t>5/16/2019</a:t>
             </a:fld>
             <a:endParaRPr lang="en-US" dirty="0"/>
           </a:p>
@@ -4809,7 +4594,7 @@
     </p:spTree>
     <p:extLst>
       <p:ext uri="{BB962C8B-B14F-4D97-AF65-F5344CB8AC3E}">
-        <p14:creationId xmlns:p14="http://schemas.microsoft.com/office/powerpoint/2010/main" val="3060083142"/>
+        <p14:creationId xmlns:p14="http://schemas.microsoft.com/office/powerpoint/2010/main" val="1485989430"/>
       </p:ext>
     </p:extLst>
   </p:cSld>
@@ -4854,7 +4639,7 @@
             <a:fld id="{B61BEF0D-F0BB-DE4B-95CE-6DB70DBA9567}" type="datetimeFigureOut">
               <a:rPr lang="en-US" smtClean="0"/>
               <a:pPr/>
-              <a:t>5/13/2019</a:t>
+              <a:t>5/16/2019</a:t>
             </a:fld>
             <a:endParaRPr lang="en-US" dirty="0"/>
           </a:p>
@@ -4906,7 +4691,7 @@
     </p:spTree>
     <p:extLst>
       <p:ext uri="{BB962C8B-B14F-4D97-AF65-F5344CB8AC3E}">
-        <p14:creationId xmlns:p14="http://schemas.microsoft.com/office/powerpoint/2010/main" val="4076131380"/>
+        <p14:creationId xmlns:p14="http://schemas.microsoft.com/office/powerpoint/2010/main" val="1618519967"/>
       </p:ext>
     </p:extLst>
   </p:cSld>
@@ -5105,7 +4890,7 @@
             <a:fld id="{B61BEF0D-F0BB-DE4B-95CE-6DB70DBA9567}" type="datetimeFigureOut">
               <a:rPr lang="en-US" smtClean="0"/>
               <a:pPr/>
-              <a:t>5/13/2019</a:t>
+              <a:t>5/16/2019</a:t>
             </a:fld>
             <a:endParaRPr lang="en-US" dirty="0"/>
           </a:p>
@@ -5157,7 +4942,7 @@
     </p:spTree>
     <p:extLst>
       <p:ext uri="{BB962C8B-B14F-4D97-AF65-F5344CB8AC3E}">
-        <p14:creationId xmlns:p14="http://schemas.microsoft.com/office/powerpoint/2010/main" val="2721892101"/>
+        <p14:creationId xmlns:p14="http://schemas.microsoft.com/office/powerpoint/2010/main" val="308185404"/>
       </p:ext>
     </p:extLst>
   </p:cSld>
@@ -5364,7 +5149,7 @@
             <a:fld id="{B61BEF0D-F0BB-DE4B-95CE-6DB70DBA9567}" type="datetimeFigureOut">
               <a:rPr lang="en-US" smtClean="0"/>
               <a:pPr/>
-              <a:t>5/13/2019</a:t>
+              <a:t>5/16/2019</a:t>
             </a:fld>
             <a:endParaRPr lang="en-US" dirty="0"/>
           </a:p>
@@ -5416,7 +5201,7 @@
     </p:spTree>
     <p:extLst>
       <p:ext uri="{BB962C8B-B14F-4D97-AF65-F5344CB8AC3E}">
-        <p14:creationId xmlns:p14="http://schemas.microsoft.com/office/powerpoint/2010/main" val="2388731000"/>
+        <p14:creationId xmlns:p14="http://schemas.microsoft.com/office/powerpoint/2010/main" val="4149092930"/>
       </p:ext>
     </p:extLst>
   </p:cSld>
@@ -5609,7 +5394,7 @@
             <a:fld id="{B61BEF0D-F0BB-DE4B-95CE-6DB70DBA9567}" type="datetimeFigureOut">
               <a:rPr lang="en-US" smtClean="0"/>
               <a:pPr/>
-              <a:t>5/13/2019</a:t>
+              <a:t>5/16/2019</a:t>
             </a:fld>
             <a:endParaRPr lang="en-US" dirty="0"/>
           </a:p>
@@ -5697,29 +5482,29 @@
     </p:spTree>
     <p:extLst>
       <p:ext uri="{BB962C8B-B14F-4D97-AF65-F5344CB8AC3E}">
-        <p14:creationId xmlns:p14="http://schemas.microsoft.com/office/powerpoint/2010/main" val="2579463488"/>
+        <p14:creationId xmlns:p14="http://schemas.microsoft.com/office/powerpoint/2010/main" val="3799442967"/>
       </p:ext>
     </p:extLst>
   </p:cSld>
   <p:clrMap bg1="dk1" tx1="lt1" bg2="dk2" tx2="lt2" accent1="accent1" accent2="accent2" accent3="accent3" accent4="accent4" accent5="accent5" accent6="accent6" hlink="hlink" folHlink="folHlink"/>
   <p:sldLayoutIdLst>
-    <p:sldLayoutId id="2147483661" r:id="rId1"/>
-    <p:sldLayoutId id="2147483662" r:id="rId2"/>
-    <p:sldLayoutId id="2147483663" r:id="rId3"/>
-    <p:sldLayoutId id="2147483664" r:id="rId4"/>
-    <p:sldLayoutId id="2147483665" r:id="rId5"/>
-    <p:sldLayoutId id="2147483666" r:id="rId6"/>
-    <p:sldLayoutId id="2147483667" r:id="rId7"/>
-    <p:sldLayoutId id="2147483668" r:id="rId8"/>
-    <p:sldLayoutId id="2147483669" r:id="rId9"/>
-    <p:sldLayoutId id="2147483670" r:id="rId10"/>
-    <p:sldLayoutId id="2147483671" r:id="rId11"/>
-    <p:sldLayoutId id="2147483672" r:id="rId12"/>
-    <p:sldLayoutId id="2147483673" r:id="rId13"/>
-    <p:sldLayoutId id="2147483674" r:id="rId14"/>
-    <p:sldLayoutId id="2147483675" r:id="rId15"/>
-    <p:sldLayoutId id="2147483676" r:id="rId16"/>
-    <p:sldLayoutId id="2147483677" r:id="rId17"/>
+    <p:sldLayoutId id="2147483697" r:id="rId1"/>
+    <p:sldLayoutId id="2147483698" r:id="rId2"/>
+    <p:sldLayoutId id="2147483699" r:id="rId3"/>
+    <p:sldLayoutId id="2147483700" r:id="rId4"/>
+    <p:sldLayoutId id="2147483701" r:id="rId5"/>
+    <p:sldLayoutId id="2147483702" r:id="rId6"/>
+    <p:sldLayoutId id="2147483703" r:id="rId7"/>
+    <p:sldLayoutId id="2147483704" r:id="rId8"/>
+    <p:sldLayoutId id="2147483705" r:id="rId9"/>
+    <p:sldLayoutId id="2147483706" r:id="rId10"/>
+    <p:sldLayoutId id="2147483707" r:id="rId11"/>
+    <p:sldLayoutId id="2147483708" r:id="rId12"/>
+    <p:sldLayoutId id="2147483709" r:id="rId13"/>
+    <p:sldLayoutId id="2147483710" r:id="rId14"/>
+    <p:sldLayoutId id="2147483711" r:id="rId15"/>
+    <p:sldLayoutId id="2147483712" r:id="rId16"/>
+    <p:sldLayoutId id="2147483713" r:id="rId17"/>
   </p:sldLayoutIdLst>
   <p:txStyles>
     <p:titleStyle>
@@ -6029,12 +5814,556 @@
           <a:chExt cx="0" cy="0"/>
         </a:xfrm>
       </p:grpSpPr>
-      <p:sp useBgFill="1">
-        <p:nvSpPr>
-          <p:cNvPr id="8" name="Rectangle 7">
+      <p:sp>
+        <p:nvSpPr>
+          <p:cNvPr id="2" name="Title 1"/>
+          <p:cNvSpPr>
+            <a:spLocks noGrp="1"/>
+          </p:cNvSpPr>
+          <p:nvPr>
+            <p:ph type="ctrTitle"/>
+          </p:nvPr>
+        </p:nvSpPr>
+        <p:spPr>
+          <a:xfrm>
+            <a:off x="4976028" y="965200"/>
+            <a:ext cx="6170943" cy="4329641"/>
+          </a:xfrm>
+        </p:spPr>
+        <p:txBody>
+          <a:bodyPr anchor="ctr">
+            <a:normAutofit/>
+          </a:bodyPr>
+          <a:lstStyle/>
+          <a:p>
+            <a:r>
+              <a:rPr lang="en-US" sz="5400" dirty="0"/>
+              <a:t>Stock Mate</a:t>
+            </a:r>
+          </a:p>
+        </p:txBody>
+      </p:sp>
+      <p:sp>
+        <p:nvSpPr>
+          <p:cNvPr id="3" name="Subtitle 2"/>
+          <p:cNvSpPr>
+            <a:spLocks noGrp="1"/>
+          </p:cNvSpPr>
+          <p:nvPr>
+            <p:ph type="subTitle" idx="1"/>
+          </p:nvPr>
+        </p:nvSpPr>
+        <p:spPr>
+          <a:xfrm>
+            <a:off x="-1" y="965200"/>
+            <a:ext cx="4455617" cy="4329641"/>
+          </a:xfrm>
+        </p:spPr>
+        <p:txBody>
+          <a:bodyPr anchor="ctr">
+            <a:normAutofit/>
+          </a:bodyPr>
+          <a:lstStyle/>
+          <a:p>
+            <a:pPr algn="r"/>
+            <a:r>
+              <a:rPr lang="en-US" sz="2400" dirty="0"/>
+              <a:t>SEIS 635  Spring 2019</a:t>
+            </a:r>
+          </a:p>
+          <a:p>
+            <a:pPr algn="r"/>
+            <a:r>
+              <a:rPr lang="en-US" sz="2400" dirty="0"/>
+              <a:t>Wolves of Wallstreet:</a:t>
+            </a:r>
+          </a:p>
+          <a:p>
+            <a:pPr algn="r"/>
+            <a:r>
+              <a:rPr lang="en-US" sz="2400" dirty="0"/>
+              <a:t>David Hedeen, Chris Nathan</a:t>
+            </a:r>
+          </a:p>
+        </p:txBody>
+      </p:sp>
+    </p:spTree>
+    <p:extLst>
+      <p:ext uri="{BB962C8B-B14F-4D97-AF65-F5344CB8AC3E}">
+        <p14:creationId xmlns:p14="http://schemas.microsoft.com/office/powerpoint/2010/main" val="94367404"/>
+      </p:ext>
+    </p:extLst>
+  </p:cSld>
+  <p:clrMapOvr>
+    <a:masterClrMapping/>
+  </p:clrMapOvr>
+</p:sld>
+</file>
+
+<file path=ppt/slides/slide10.xml><?xml version="1.0" encoding="utf-8"?>
+<p:sld xmlns:a="http://schemas.openxmlformats.org/drawingml/2006/main" xmlns:r="http://schemas.openxmlformats.org/officeDocument/2006/relationships" xmlns:p="http://schemas.openxmlformats.org/presentationml/2006/main">
+  <p:cSld>
+    <p:bg>
+      <p:bgPr>
+        <a:solidFill>
+          <a:schemeClr val="bg1"/>
+        </a:solidFill>
+        <a:effectLst/>
+      </p:bgPr>
+    </p:bg>
+    <p:spTree>
+      <p:nvGrpSpPr>
+        <p:cNvPr id="1" name=""/>
+        <p:cNvGrpSpPr/>
+        <p:nvPr/>
+      </p:nvGrpSpPr>
+      <p:grpSpPr>
+        <a:xfrm>
+          <a:off x="0" y="0"/>
+          <a:ext cx="0" cy="0"/>
+          <a:chOff x="0" y="0"/>
+          <a:chExt cx="0" cy="0"/>
+        </a:xfrm>
+      </p:grpSpPr>
+      <p:pic>
+        <p:nvPicPr>
+          <p:cNvPr id="3" name="Picture 2">
             <a:extLst>
               <a:ext uri="{FF2B5EF4-FFF2-40B4-BE49-F238E27FC236}">
-                <a16:creationId xmlns:a16="http://schemas.microsoft.com/office/drawing/2014/main" id="{E770CA6A-B3B0-4826-A91F-B2B1F8922026}"/>
+                <a16:creationId xmlns:a16="http://schemas.microsoft.com/office/drawing/2014/main" id="{CF1642F1-661A-4DAE-9C70-EED925FFDB3B}"/>
+              </a:ext>
+            </a:extLst>
+          </p:cNvPr>
+          <p:cNvPicPr>
+            <a:picLocks noChangeAspect="1"/>
+          </p:cNvPicPr>
+          <p:nvPr/>
+        </p:nvPicPr>
+        <p:blipFill rotWithShape="1">
+          <a:blip r:embed="rId2"/>
+          <a:srcRect l="25811" t="-1085" r="48878" b="31628"/>
+          <a:stretch/>
+        </p:blipFill>
+        <p:spPr>
+          <a:xfrm>
+            <a:off x="4293713" y="22147"/>
+            <a:ext cx="3604573" cy="6813706"/>
+          </a:xfrm>
+          <a:prstGeom prst="rect">
+            <a:avLst/>
+          </a:prstGeom>
+        </p:spPr>
+      </p:pic>
+    </p:spTree>
+    <p:extLst>
+      <p:ext uri="{BB962C8B-B14F-4D97-AF65-F5344CB8AC3E}">
+        <p14:creationId xmlns:p14="http://schemas.microsoft.com/office/powerpoint/2010/main" val="3707161883"/>
+      </p:ext>
+    </p:extLst>
+  </p:cSld>
+  <p:clrMapOvr>
+    <a:masterClrMapping/>
+  </p:clrMapOvr>
+</p:sld>
+</file>
+
+<file path=ppt/slides/slide11.xml><?xml version="1.0" encoding="utf-8"?>
+<p:sld xmlns:a="http://schemas.openxmlformats.org/drawingml/2006/main" xmlns:r="http://schemas.openxmlformats.org/officeDocument/2006/relationships" xmlns:p="http://schemas.openxmlformats.org/presentationml/2006/main">
+  <p:cSld>
+    <p:bg>
+      <p:bgPr>
+        <a:solidFill>
+          <a:schemeClr val="bg1"/>
+        </a:solidFill>
+        <a:effectLst/>
+      </p:bgPr>
+    </p:bg>
+    <p:spTree>
+      <p:nvGrpSpPr>
+        <p:cNvPr id="1" name=""/>
+        <p:cNvGrpSpPr/>
+        <p:nvPr/>
+      </p:nvGrpSpPr>
+      <p:grpSpPr>
+        <a:xfrm>
+          <a:off x="0" y="0"/>
+          <a:ext cx="0" cy="0"/>
+          <a:chOff x="0" y="0"/>
+          <a:chExt cx="0" cy="0"/>
+        </a:xfrm>
+      </p:grpSpPr>
+      <p:pic>
+        <p:nvPicPr>
+          <p:cNvPr id="3" name="Picture 2">
+            <a:extLst>
+              <a:ext uri="{FF2B5EF4-FFF2-40B4-BE49-F238E27FC236}">
+                <a16:creationId xmlns:a16="http://schemas.microsoft.com/office/drawing/2014/main" id="{757DCBEF-A379-43E6-9DFF-BBA09236D185}"/>
+              </a:ext>
+            </a:extLst>
+          </p:cNvPr>
+          <p:cNvPicPr>
+            <a:picLocks noChangeAspect="1"/>
+          </p:cNvPicPr>
+          <p:nvPr/>
+        </p:nvPicPr>
+        <p:blipFill rotWithShape="1">
+          <a:blip r:embed="rId2"/>
+          <a:srcRect l="56461" t="31318" r="23567" b="37210"/>
+          <a:stretch/>
+        </p:blipFill>
+        <p:spPr>
+          <a:xfrm>
+            <a:off x="3154188" y="235484"/>
+            <a:ext cx="5883623" cy="6387031"/>
+          </a:xfrm>
+          <a:prstGeom prst="rect">
+            <a:avLst/>
+          </a:prstGeom>
+        </p:spPr>
+      </p:pic>
+    </p:spTree>
+    <p:extLst>
+      <p:ext uri="{BB962C8B-B14F-4D97-AF65-F5344CB8AC3E}">
+        <p14:creationId xmlns:p14="http://schemas.microsoft.com/office/powerpoint/2010/main" val="2241289334"/>
+      </p:ext>
+    </p:extLst>
+  </p:cSld>
+  <p:clrMapOvr>
+    <a:masterClrMapping/>
+  </p:clrMapOvr>
+</p:sld>
+</file>
+
+<file path=ppt/slides/slide12.xml><?xml version="1.0" encoding="utf-8"?>
+<p:sld xmlns:a="http://schemas.openxmlformats.org/drawingml/2006/main" xmlns:r="http://schemas.openxmlformats.org/officeDocument/2006/relationships" xmlns:p="http://schemas.openxmlformats.org/presentationml/2006/main">
+  <p:cSld>
+    <p:bg>
+      <p:bgPr>
+        <a:solidFill>
+          <a:schemeClr val="bg1"/>
+        </a:solidFill>
+        <a:effectLst/>
+      </p:bgPr>
+    </p:bg>
+    <p:spTree>
+      <p:nvGrpSpPr>
+        <p:cNvPr id="1" name=""/>
+        <p:cNvGrpSpPr/>
+        <p:nvPr/>
+      </p:nvGrpSpPr>
+      <p:grpSpPr>
+        <a:xfrm>
+          <a:off x="0" y="0"/>
+          <a:ext cx="0" cy="0"/>
+          <a:chOff x="0" y="0"/>
+          <a:chExt cx="0" cy="0"/>
+        </a:xfrm>
+      </p:grpSpPr>
+      <p:pic>
+        <p:nvPicPr>
+          <p:cNvPr id="5" name="Picture 4">
+            <a:extLst>
+              <a:ext uri="{FF2B5EF4-FFF2-40B4-BE49-F238E27FC236}">
+                <a16:creationId xmlns:a16="http://schemas.microsoft.com/office/drawing/2014/main" id="{ACCAF9AE-AF8E-44AE-9FA4-95B97EFE4601}"/>
+              </a:ext>
+            </a:extLst>
+          </p:cNvPr>
+          <p:cNvPicPr>
+            <a:picLocks noChangeAspect="1"/>
+          </p:cNvPicPr>
+          <p:nvPr/>
+        </p:nvPicPr>
+        <p:blipFill rotWithShape="1">
+          <a:blip r:embed="rId2"/>
+          <a:srcRect l="59239" r="9790" b="72403"/>
+          <a:stretch/>
+        </p:blipFill>
+        <p:spPr>
+          <a:xfrm>
+            <a:off x="409432" y="1818168"/>
+            <a:ext cx="5965877" cy="3661813"/>
+          </a:xfrm>
+          <a:prstGeom prst="rect">
+            <a:avLst/>
+          </a:prstGeom>
+        </p:spPr>
+      </p:pic>
+      <p:pic>
+        <p:nvPicPr>
+          <p:cNvPr id="2" name="Picture 1">
+            <a:extLst>
+              <a:ext uri="{FF2B5EF4-FFF2-40B4-BE49-F238E27FC236}">
+                <a16:creationId xmlns:a16="http://schemas.microsoft.com/office/drawing/2014/main" id="{65BE288A-A531-4392-B892-1622B2BD7E65}"/>
+              </a:ext>
+            </a:extLst>
+          </p:cNvPr>
+          <p:cNvPicPr>
+            <a:picLocks noChangeAspect="1"/>
+          </p:cNvPicPr>
+          <p:nvPr/>
+        </p:nvPicPr>
+        <p:blipFill>
+          <a:blip r:embed="rId3"/>
+          <a:stretch>
+            <a:fillRect/>
+          </a:stretch>
+        </p:blipFill>
+        <p:spPr>
+          <a:xfrm>
+            <a:off x="7240513" y="1818167"/>
+            <a:ext cx="4542056" cy="3661813"/>
+          </a:xfrm>
+          <a:prstGeom prst="rect">
+            <a:avLst/>
+          </a:prstGeom>
+        </p:spPr>
+      </p:pic>
+    </p:spTree>
+    <p:extLst>
+      <p:ext uri="{BB962C8B-B14F-4D97-AF65-F5344CB8AC3E}">
+        <p14:creationId xmlns:p14="http://schemas.microsoft.com/office/powerpoint/2010/main" val="1516757061"/>
+      </p:ext>
+    </p:extLst>
+  </p:cSld>
+  <p:clrMapOvr>
+    <a:masterClrMapping/>
+  </p:clrMapOvr>
+</p:sld>
+</file>
+
+<file path=ppt/slides/slide13.xml><?xml version="1.0" encoding="utf-8"?>
+<p:sld xmlns:a="http://schemas.openxmlformats.org/drawingml/2006/main" xmlns:r="http://schemas.openxmlformats.org/officeDocument/2006/relationships" xmlns:p="http://schemas.openxmlformats.org/presentationml/2006/main">
+  <p:cSld>
+    <p:bg>
+      <p:bgPr>
+        <a:solidFill>
+          <a:schemeClr val="bg1"/>
+        </a:solidFill>
+        <a:effectLst/>
+      </p:bgPr>
+    </p:bg>
+    <p:spTree>
+      <p:nvGrpSpPr>
+        <p:cNvPr id="1" name=""/>
+        <p:cNvGrpSpPr/>
+        <p:nvPr/>
+      </p:nvGrpSpPr>
+      <p:grpSpPr>
+        <a:xfrm>
+          <a:off x="0" y="0"/>
+          <a:ext cx="0" cy="0"/>
+          <a:chOff x="0" y="0"/>
+          <a:chExt cx="0" cy="0"/>
+        </a:xfrm>
+      </p:grpSpPr>
+      <p:pic>
+        <p:nvPicPr>
+          <p:cNvPr id="4" name="Picture 3">
+            <a:extLst>
+              <a:ext uri="{FF2B5EF4-FFF2-40B4-BE49-F238E27FC236}">
+                <a16:creationId xmlns:a16="http://schemas.microsoft.com/office/drawing/2014/main" id="{38F3F832-43B1-498E-A499-9E71A9508700}"/>
+              </a:ext>
+            </a:extLst>
+          </p:cNvPr>
+          <p:cNvPicPr>
+            <a:picLocks noChangeAspect="1"/>
+          </p:cNvPicPr>
+          <p:nvPr/>
+        </p:nvPicPr>
+        <p:blipFill rotWithShape="1">
+          <a:blip r:embed="rId2"/>
+          <a:srcRect l="46209" t="70077"/>
+          <a:stretch/>
+        </p:blipFill>
+        <p:spPr>
+          <a:xfrm>
+            <a:off x="406697" y="1248916"/>
+            <a:ext cx="11378605" cy="4360168"/>
+          </a:xfrm>
+          <a:prstGeom prst="rect">
+            <a:avLst/>
+          </a:prstGeom>
+        </p:spPr>
+      </p:pic>
+    </p:spTree>
+    <p:extLst>
+      <p:ext uri="{BB962C8B-B14F-4D97-AF65-F5344CB8AC3E}">
+        <p14:creationId xmlns:p14="http://schemas.microsoft.com/office/powerpoint/2010/main" val="1129216499"/>
+      </p:ext>
+    </p:extLst>
+  </p:cSld>
+  <p:clrMapOvr>
+    <a:masterClrMapping/>
+  </p:clrMapOvr>
+</p:sld>
+</file>
+
+<file path=ppt/slides/slide14.xml><?xml version="1.0" encoding="utf-8"?>
+<p:sld xmlns:a="http://schemas.openxmlformats.org/drawingml/2006/main" xmlns:r="http://schemas.openxmlformats.org/officeDocument/2006/relationships" xmlns:p="http://schemas.openxmlformats.org/presentationml/2006/main">
+  <p:cSld>
+    <p:bg>
+      <p:bgPr>
+        <a:solidFill>
+          <a:schemeClr val="bg1"/>
+        </a:solidFill>
+        <a:effectLst/>
+      </p:bgPr>
+    </p:bg>
+    <p:spTree>
+      <p:nvGrpSpPr>
+        <p:cNvPr id="1" name=""/>
+        <p:cNvGrpSpPr/>
+        <p:nvPr/>
+      </p:nvGrpSpPr>
+      <p:grpSpPr>
+        <a:xfrm>
+          <a:off x="0" y="0"/>
+          <a:ext cx="0" cy="0"/>
+          <a:chOff x="0" y="0"/>
+          <a:chExt cx="0" cy="0"/>
+        </a:xfrm>
+      </p:grpSpPr>
+      <p:pic>
+        <p:nvPicPr>
+          <p:cNvPr id="4" name="Picture 3">
+            <a:extLst>
+              <a:ext uri="{FF2B5EF4-FFF2-40B4-BE49-F238E27FC236}">
+                <a16:creationId xmlns:a16="http://schemas.microsoft.com/office/drawing/2014/main" id="{38F3F832-43B1-498E-A499-9E71A9508700}"/>
+              </a:ext>
+            </a:extLst>
+          </p:cNvPr>
+          <p:cNvPicPr>
+            <a:picLocks noChangeAspect="1"/>
+          </p:cNvPicPr>
+          <p:nvPr/>
+        </p:nvPicPr>
+        <p:blipFill rotWithShape="1">
+          <a:blip r:embed="rId2"/>
+          <a:srcRect l="46209" t="70077"/>
+          <a:stretch/>
+        </p:blipFill>
+        <p:spPr>
+          <a:xfrm>
+            <a:off x="406697" y="1248916"/>
+            <a:ext cx="11378605" cy="4360168"/>
+          </a:xfrm>
+          <a:prstGeom prst="rect">
+            <a:avLst/>
+          </a:prstGeom>
+        </p:spPr>
+      </p:pic>
+    </p:spTree>
+    <p:extLst>
+      <p:ext uri="{BB962C8B-B14F-4D97-AF65-F5344CB8AC3E}">
+        <p14:creationId xmlns:p14="http://schemas.microsoft.com/office/powerpoint/2010/main" val="3506840218"/>
+      </p:ext>
+    </p:extLst>
+  </p:cSld>
+  <p:clrMapOvr>
+    <a:masterClrMapping/>
+  </p:clrMapOvr>
+</p:sld>
+</file>
+
+<file path=ppt/slides/slide15.xml><?xml version="1.0" encoding="utf-8"?>
+<p:sld xmlns:a="http://schemas.openxmlformats.org/drawingml/2006/main" xmlns:r="http://schemas.openxmlformats.org/officeDocument/2006/relationships" xmlns:p="http://schemas.openxmlformats.org/presentationml/2006/main">
+  <p:cSld>
+    <p:bg>
+      <p:bgPr>
+        <a:solidFill>
+          <a:schemeClr val="bg1"/>
+        </a:solidFill>
+        <a:effectLst/>
+      </p:bgPr>
+    </p:bg>
+    <p:spTree>
+      <p:nvGrpSpPr>
+        <p:cNvPr id="1" name=""/>
+        <p:cNvGrpSpPr/>
+        <p:nvPr/>
+      </p:nvGrpSpPr>
+      <p:grpSpPr>
+        <a:xfrm>
+          <a:off x="0" y="0"/>
+          <a:ext cx="0" cy="0"/>
+          <a:chOff x="0" y="0"/>
+          <a:chExt cx="0" cy="0"/>
+        </a:xfrm>
+      </p:grpSpPr>
+      <p:pic>
+        <p:nvPicPr>
+          <p:cNvPr id="2" name="Picture 1">
+            <a:extLst>
+              <a:ext uri="{FF2B5EF4-FFF2-40B4-BE49-F238E27FC236}">
+                <a16:creationId xmlns:a16="http://schemas.microsoft.com/office/drawing/2014/main" id="{95595C94-2C64-4B47-B8B0-B9599B6DDE13}"/>
+              </a:ext>
+            </a:extLst>
+          </p:cNvPr>
+          <p:cNvPicPr>
+            <a:picLocks noChangeAspect="1"/>
+          </p:cNvPicPr>
+          <p:nvPr/>
+        </p:nvPicPr>
+        <p:blipFill>
+          <a:blip r:embed="rId2"/>
+          <a:stretch>
+            <a:fillRect/>
+          </a:stretch>
+        </p:blipFill>
+        <p:spPr>
+          <a:xfrm>
+            <a:off x="3701029" y="1133820"/>
+            <a:ext cx="4789941" cy="4590359"/>
+          </a:xfrm>
+          <a:prstGeom prst="rect">
+            <a:avLst/>
+          </a:prstGeom>
+        </p:spPr>
+      </p:pic>
+    </p:spTree>
+    <p:extLst>
+      <p:ext uri="{BB962C8B-B14F-4D97-AF65-F5344CB8AC3E}">
+        <p14:creationId xmlns:p14="http://schemas.microsoft.com/office/powerpoint/2010/main" val="4406569"/>
+      </p:ext>
+    </p:extLst>
+  </p:cSld>
+  <p:clrMapOvr>
+    <a:masterClrMapping/>
+  </p:clrMapOvr>
+</p:sld>
+</file>
+
+<file path=ppt/slides/slide16.xml><?xml version="1.0" encoding="utf-8"?>
+<p:sld xmlns:a="http://schemas.openxmlformats.org/drawingml/2006/main" xmlns:r="http://schemas.openxmlformats.org/officeDocument/2006/relationships" xmlns:p="http://schemas.openxmlformats.org/presentationml/2006/main">
+  <p:cSld>
+    <p:bg>
+      <p:bgPr>
+        <a:solidFill>
+          <a:schemeClr val="bg1"/>
+        </a:solidFill>
+        <a:effectLst/>
+      </p:bgPr>
+    </p:bg>
+    <p:spTree>
+      <p:nvGrpSpPr>
+        <p:cNvPr id="1" name=""/>
+        <p:cNvGrpSpPr/>
+        <p:nvPr/>
+      </p:nvGrpSpPr>
+      <p:grpSpPr>
+        <a:xfrm>
+          <a:off x="0" y="0"/>
+          <a:ext cx="0" cy="0"/>
+          <a:chOff x="0" y="0"/>
+          <a:chExt cx="0" cy="0"/>
+        </a:xfrm>
+      </p:grpSpPr>
+      <p:sp useBgFill="1">
+        <p:nvSpPr>
+          <p:cNvPr id="15" name="Rounded Rectangle 14">
+            <a:extLst>
+              <a:ext uri="{FF2B5EF4-FFF2-40B4-BE49-F238E27FC236}">
+                <a16:creationId xmlns:a16="http://schemas.microsoft.com/office/drawing/2014/main" id="{1FDFF85F-F105-40D5-9793-90419158C3BD}"/>
               </a:ext>
               <a:ext uri="{C183D7F6-B498-43B3-948B-1728B52AA6E4}">
                 <adec:decorative xmlns:adec="http://schemas.microsoft.com/office/drawing/2017/decorative" val="1"/>
@@ -6054,15 +6383,18 @@
         </p:nvSpPr>
         <p:spPr>
           <a:xfrm>
-            <a:off x="0" y="0"/>
-            <a:ext cx="12192000" cy="6858000"/>
-          </a:xfrm>
-          <a:prstGeom prst="rect">
-            <a:avLst/>
+            <a:off x="4636008" y="0"/>
+            <a:ext cx="7555992" cy="6858000"/>
+          </a:xfrm>
+          <a:prstGeom prst="roundRect">
+            <a:avLst>
+              <a:gd name="adj" fmla="val 0"/>
+            </a:avLst>
           </a:prstGeom>
           <a:ln>
             <a:noFill/>
           </a:ln>
+          <a:effectLst/>
         </p:spPr>
         <p:style>
           <a:lnRef idx="2">
@@ -6084,17 +6416,145 @@
           <a:bodyPr rtlCol="0" anchor="ctr"/>
           <a:lstStyle/>
           <a:p>
-            <a:pPr algn="ctr"/>
-            <a:endParaRPr lang="en-US"/>
+            <a:pPr marL="0" marR="0" lvl="0" indent="0" algn="ctr" defTabSz="457200" rtl="0" eaLnBrk="1" fontAlgn="auto" latinLnBrk="0" hangingPunct="1">
+              <a:lnSpc>
+                <a:spcPct val="100000"/>
+              </a:lnSpc>
+              <a:spcBef>
+                <a:spcPts val="0"/>
+              </a:spcBef>
+              <a:spcAft>
+                <a:spcPts val="0"/>
+              </a:spcAft>
+              <a:buClrTx/>
+              <a:buSzTx/>
+              <a:buFontTx/>
+              <a:buNone/>
+              <a:tabLst/>
+              <a:defRPr/>
+            </a:pPr>
+            <a:endParaRPr kumimoji="0" lang="en-US" sz="1800" b="0" i="0" u="none" strike="noStrike" kern="1200" cap="none" spc="0" normalizeH="0" baseline="0" noProof="0">
+              <a:ln>
+                <a:noFill/>
+              </a:ln>
+              <a:solidFill>
+                <a:prstClr val="white"/>
+              </a:solidFill>
+              <a:effectLst/>
+              <a:uLnTx/>
+              <a:uFillTx/>
+              <a:latin typeface="Century Gothic" panose="020B0502020202020204"/>
+              <a:ea typeface="+mn-ea"/>
+              <a:cs typeface="+mn-cs"/>
+            </a:endParaRPr>
+          </a:p>
+        </p:txBody>
+      </p:sp>
+      <p:sp>
+        <p:nvSpPr>
+          <p:cNvPr id="17" name="Rectangle 16">
+            <a:extLst>
+              <a:ext uri="{FF2B5EF4-FFF2-40B4-BE49-F238E27FC236}">
+                <a16:creationId xmlns:a16="http://schemas.microsoft.com/office/drawing/2014/main" id="{35AB47A4-BA8C-4250-88BD-D49C68C5F9E9}"/>
+              </a:ext>
+              <a:ext uri="{C183D7F6-B498-43B3-948B-1728B52AA6E4}">
+                <adec:decorative xmlns:adec="http://schemas.microsoft.com/office/drawing/2017/decorative" val="1"/>
+              </a:ext>
+            </a:extLst>
+          </p:cNvPr>
+          <p:cNvSpPr>
+            <a:spLocks noGrp="1" noRot="1" noChangeAspect="1" noMove="1" noResize="1" noEditPoints="1" noAdjustHandles="1" noChangeArrowheads="1" noChangeShapeType="1" noTextEdit="1"/>
+          </p:cNvSpPr>
+          <p:nvPr>
+            <p:extLst>
+              <p:ext uri="{386F3935-93C4-4BCD-93E2-E3B085C9AB24}">
+                <p16:designElem xmlns:p16="http://schemas.microsoft.com/office/powerpoint/2015/main" val="1"/>
+              </p:ext>
+            </p:extLst>
+          </p:nvPr>
+        </p:nvSpPr>
+        <p:spPr>
+          <a:xfrm>
+            <a:off x="0" y="0"/>
+            <a:ext cx="4636008" cy="6858000"/>
+          </a:xfrm>
+          <a:prstGeom prst="rect">
+            <a:avLst/>
+          </a:prstGeom>
+          <a:solidFill>
+            <a:schemeClr val="tx1"/>
+          </a:solidFill>
+          <a:ln>
+            <a:noFill/>
+          </a:ln>
+          <a:effectLst>
+            <a:outerShdw blurRad="63500" dist="38100" algn="l" rotWithShape="0">
+              <a:prstClr val="black">
+                <a:alpha val="40000"/>
+              </a:prstClr>
+            </a:outerShdw>
+          </a:effectLst>
+        </p:spPr>
+        <p:style>
+          <a:lnRef idx="2">
+            <a:schemeClr val="accent1">
+              <a:shade val="50000"/>
+            </a:schemeClr>
+          </a:lnRef>
+          <a:fillRef idx="1">
+            <a:schemeClr val="accent1"/>
+          </a:fillRef>
+          <a:effectRef idx="0">
+            <a:schemeClr val="accent1"/>
+          </a:effectRef>
+          <a:fontRef idx="minor">
+            <a:schemeClr val="lt1"/>
+          </a:fontRef>
+        </p:style>
+        <p:txBody>
+          <a:bodyPr rtlCol="0" anchor="ctr"/>
+          <a:lstStyle/>
+          <a:p>
+            <a:pPr marL="0" marR="0" lvl="0" indent="0" algn="ctr" defTabSz="457200" rtl="0" eaLnBrk="1" fontAlgn="auto" latinLnBrk="0" hangingPunct="1">
+              <a:lnSpc>
+                <a:spcPct val="100000"/>
+              </a:lnSpc>
+              <a:spcBef>
+                <a:spcPts val="0"/>
+              </a:spcBef>
+              <a:spcAft>
+                <a:spcPts val="0"/>
+              </a:spcAft>
+              <a:buClrTx/>
+              <a:buSzTx/>
+              <a:buFontTx/>
+              <a:buNone/>
+              <a:tabLst/>
+              <a:defRPr/>
+            </a:pPr>
+            <a:endParaRPr kumimoji="0" lang="en-US" sz="1800" b="0" i="0" u="none" strike="noStrike" kern="1200" cap="none" spc="0" normalizeH="0" baseline="0" noProof="0">
+              <a:ln>
+                <a:noFill/>
+              </a:ln>
+              <a:solidFill>
+                <a:prstClr val="white"/>
+              </a:solidFill>
+              <a:effectLst/>
+              <a:uLnTx/>
+              <a:uFillTx/>
+              <a:latin typeface="Century Gothic" panose="020B0502020202020204"/>
+              <a:ea typeface="+mn-ea"/>
+              <a:cs typeface="+mn-cs"/>
+            </a:endParaRPr>
           </a:p>
         </p:txBody>
       </p:sp>
       <p:pic>
         <p:nvPicPr>
-          <p:cNvPr id="10" name="Picture 9">
+          <p:cNvPr id="19" name="Picture 18">
             <a:extLst>
               <a:ext uri="{FF2B5EF4-FFF2-40B4-BE49-F238E27FC236}">
-                <a16:creationId xmlns:a16="http://schemas.microsoft.com/office/drawing/2014/main" id="{3C51B9DA-B0CC-480A-8EA5-4D5C3E0515B9}"/>
+                <a16:creationId xmlns:a16="http://schemas.microsoft.com/office/drawing/2014/main" id="{66C8958D-EB99-414F-B735-863B67BB14D3}"/>
               </a:ext>
               <a:ext uri="{C183D7F6-B498-43B3-948B-1728B52AA6E4}">
                 <adec:decorative xmlns:adec="http://schemas.microsoft.com/office/drawing/2017/decorative" val="1"/>
@@ -6112,7 +6572,7 @@
             </p:extLst>
           </p:nvPr>
         </p:nvPicPr>
-        <p:blipFill>
+        <p:blipFill rotWithShape="1">
           <a:blip r:embed="rId2">
             <a:extLst>
               <a:ext uri="{28A0092B-C50C-407E-A947-70E740481C1C}">
@@ -6120,14 +6580,13 @@
               </a:ext>
             </a:extLst>
           </a:blip>
-          <a:stretch>
-            <a:fillRect/>
-          </a:stretch>
+          <a:srcRect r="61975"/>
+          <a:stretch/>
         </p:blipFill>
         <p:spPr>
           <a:xfrm>
-            <a:off x="0" y="4375150"/>
-            <a:ext cx="12192000" cy="2482850"/>
+            <a:off x="0" y="0"/>
+            <a:ext cx="4636008" cy="1441450"/>
           </a:xfrm>
           <a:prstGeom prst="rect">
             <a:avLst/>
@@ -6141,87 +6600,48 @@
             <a:spLocks noGrp="1"/>
           </p:cNvSpPr>
           <p:nvPr>
-            <p:ph type="ctrTitle"/>
-          </p:nvPr>
-        </p:nvSpPr>
-        <p:spPr>
-          <a:xfrm>
-            <a:off x="4976028" y="965200"/>
-            <a:ext cx="6170943" cy="4329641"/>
-          </a:xfrm>
-        </p:spPr>
-        <p:txBody>
-          <a:bodyPr anchor="ctr">
+            <p:ph type="title"/>
+          </p:nvPr>
+        </p:nvSpPr>
+        <p:spPr>
+          <a:xfrm>
+            <a:off x="474295" y="1948114"/>
+            <a:ext cx="3687417" cy="1920372"/>
+          </a:xfrm>
+        </p:spPr>
+        <p:txBody>
+          <a:bodyPr>
             <a:normAutofit/>
           </a:bodyPr>
           <a:lstStyle/>
           <a:p>
-            <a:r>
-              <a:rPr lang="en-US" sz="5400" dirty="0"/>
-              <a:t>Stock Mate</a:t>
-            </a:r>
-          </a:p>
-        </p:txBody>
-      </p:sp>
-      <p:sp>
-        <p:nvSpPr>
-          <p:cNvPr id="3" name="Subtitle 2"/>
-          <p:cNvSpPr>
-            <a:spLocks noGrp="1"/>
-          </p:cNvSpPr>
-          <p:nvPr>
-            <p:ph type="subTitle" idx="1"/>
-          </p:nvPr>
-        </p:nvSpPr>
-        <p:spPr>
-          <a:xfrm>
-            <a:off x="-1" y="965200"/>
-            <a:ext cx="4455617" cy="4329641"/>
-          </a:xfrm>
-        </p:spPr>
-        <p:txBody>
-          <a:bodyPr anchor="ctr">
-            <a:normAutofit/>
-          </a:bodyPr>
-          <a:lstStyle/>
-          <a:p>
-            <a:pPr algn="r"/>
-            <a:r>
-              <a:rPr lang="en-US" sz="2400" dirty="0"/>
-              <a:t>SEIS 635  Spring 2019</a:t>
-            </a:r>
-          </a:p>
-          <a:p>
-            <a:pPr algn="r"/>
-            <a:r>
-              <a:rPr lang="en-US" sz="2400" dirty="0"/>
-              <a:t>Wolves of Wallstreet:</a:t>
-            </a:r>
-          </a:p>
-          <a:p>
-            <a:pPr algn="r"/>
-            <a:r>
-              <a:rPr lang="en-US" sz="2400" dirty="0"/>
-              <a:t>David Hedeen, Chris Nathan</a:t>
-            </a:r>
-          </a:p>
-        </p:txBody>
-      </p:sp>
-      <p:cxnSp>
-        <p:nvCxnSpPr>
-          <p:cNvPr id="12" name="Straight Connector 11">
+            <a:pPr algn="l"/>
+            <a:r>
+              <a:rPr lang="en-US" sz="3300" dirty="0">
+                <a:solidFill>
+                  <a:schemeClr val="bg1"/>
+                </a:solidFill>
+              </a:rPr>
+              <a:t>UML</a:t>
+            </a:r>
+          </a:p>
+        </p:txBody>
+      </p:sp>
+      <p:pic>
+        <p:nvPicPr>
+          <p:cNvPr id="21" name="Picture 20">
             <a:extLst>
               <a:ext uri="{FF2B5EF4-FFF2-40B4-BE49-F238E27FC236}">
-                <a16:creationId xmlns:a16="http://schemas.microsoft.com/office/drawing/2014/main" id="{6FE641DB-A503-41DE-ACA6-36B41C6C2BE9}"/>
+                <a16:creationId xmlns:a16="http://schemas.microsoft.com/office/drawing/2014/main" id="{39E5F3CB-7BDD-4E64-B274-CD900F08C6F3}"/>
               </a:ext>
               <a:ext uri="{C183D7F6-B498-43B3-948B-1728B52AA6E4}">
                 <adec:decorative xmlns:adec="http://schemas.microsoft.com/office/drawing/2017/decorative" val="1"/>
               </a:ext>
             </a:extLst>
           </p:cNvPr>
-          <p:cNvCxnSpPr>
-            <a:cxnSpLocks noGrp="1" noRot="1" noChangeAspect="1" noMove="1" noResize="1" noEditPoints="1" noAdjustHandles="1" noChangeArrowheads="1" noChangeShapeType="1"/>
-          </p:cNvCxnSpPr>
+          <p:cNvPicPr>
+            <a:picLocks noGrp="1" noRot="1" noChangeAspect="1" noMove="1" noResize="1" noEditPoints="1" noAdjustHandles="1" noChangeArrowheads="1" noChangeShapeType="1" noCrop="1"/>
+          </p:cNvPicPr>
           <p:nvPr>
             <p:extLst>
               <p:ext uri="{386F3935-93C4-4BCD-93E2-E3B085C9AB24}">
@@ -6229,40 +6649,335 @@
               </p:ext>
             </p:extLst>
           </p:nvPr>
-        </p:nvCxnSpPr>
-        <p:spPr>
-          <a:xfrm>
-            <a:off x="4654295" y="1621260"/>
-            <a:ext cx="0" cy="3017520"/>
-          </a:xfrm>
-          <a:prstGeom prst="line">
+        </p:nvPicPr>
+        <p:blipFill rotWithShape="1">
+          <a:blip r:embed="rId3">
+            <a:extLst>
+              <a:ext uri="{28A0092B-C50C-407E-A947-70E740481C1C}">
+                <a14:useLocalDpi xmlns:a14="http://schemas.microsoft.com/office/drawing/2010/main" val="0"/>
+              </a:ext>
+            </a:extLst>
+          </a:blip>
+          <a:srcRect r="61975"/>
+          <a:stretch/>
+        </p:blipFill>
+        <p:spPr>
+          <a:xfrm>
+            <a:off x="0" y="4375150"/>
+            <a:ext cx="4636008" cy="2482850"/>
+          </a:xfrm>
+          <a:prstGeom prst="rect">
             <a:avLst/>
           </a:prstGeom>
-          <a:ln w="15875">
-            <a:solidFill>
-              <a:schemeClr val="tx1"/>
-            </a:solidFill>
-          </a:ln>
-        </p:spPr>
-        <p:style>
-          <a:lnRef idx="1">
-            <a:schemeClr val="accent1"/>
-          </a:lnRef>
-          <a:fillRef idx="0">
-            <a:schemeClr val="accent1"/>
-          </a:fillRef>
-          <a:effectRef idx="0">
-            <a:schemeClr val="accent1"/>
-          </a:effectRef>
-          <a:fontRef idx="minor">
-            <a:schemeClr val="tx1"/>
-          </a:fontRef>
-        </p:style>
-      </p:cxnSp>
+        </p:spPr>
+      </p:pic>
+      <p:pic>
+        <p:nvPicPr>
+          <p:cNvPr id="10" name="Content Placeholder 6">
+            <a:extLst>
+              <a:ext uri="{FF2B5EF4-FFF2-40B4-BE49-F238E27FC236}">
+                <a16:creationId xmlns:a16="http://schemas.microsoft.com/office/drawing/2014/main" id="{2FB99238-8A79-461B-AE8E-7477BD38CAF6}"/>
+              </a:ext>
+            </a:extLst>
+          </p:cNvPr>
+          <p:cNvPicPr>
+            <a:picLocks noChangeAspect="1"/>
+          </p:cNvPicPr>
+          <p:nvPr/>
+        </p:nvPicPr>
+        <p:blipFill>
+          <a:blip r:embed="rId4"/>
+          <a:stretch>
+            <a:fillRect/>
+          </a:stretch>
+        </p:blipFill>
+        <p:spPr>
+          <a:xfrm>
+            <a:off x="2252867" y="0"/>
+            <a:ext cx="9939133" cy="6858000"/>
+          </a:xfrm>
+          <a:prstGeom prst="rect">
+            <a:avLst/>
+          </a:prstGeom>
+        </p:spPr>
+      </p:pic>
     </p:spTree>
     <p:extLst>
       <p:ext uri="{BB962C8B-B14F-4D97-AF65-F5344CB8AC3E}">
-        <p14:creationId xmlns:p14="http://schemas.microsoft.com/office/powerpoint/2010/main" val="94367404"/>
+        <p14:creationId xmlns:p14="http://schemas.microsoft.com/office/powerpoint/2010/main" val="980673194"/>
+      </p:ext>
+    </p:extLst>
+  </p:cSld>
+  <p:clrMapOvr>
+    <a:overrideClrMapping bg1="lt1" tx1="dk1" bg2="lt2" tx2="dk2" accent1="accent1" accent2="accent2" accent3="accent3" accent4="accent4" accent5="accent5" accent6="accent6" hlink="hlink" folHlink="folHlink"/>
+  </p:clrMapOvr>
+</p:sld>
+</file>
+
+<file path=ppt/slides/slide17.xml><?xml version="1.0" encoding="utf-8"?>
+<p:sld xmlns:a="http://schemas.openxmlformats.org/drawingml/2006/main" xmlns:r="http://schemas.openxmlformats.org/officeDocument/2006/relationships" xmlns:p="http://schemas.openxmlformats.org/presentationml/2006/main">
+  <p:cSld>
+    <p:spTree>
+      <p:nvGrpSpPr>
+        <p:cNvPr id="1" name=""/>
+        <p:cNvGrpSpPr/>
+        <p:nvPr/>
+      </p:nvGrpSpPr>
+      <p:grpSpPr>
+        <a:xfrm>
+          <a:off x="0" y="0"/>
+          <a:ext cx="0" cy="0"/>
+          <a:chOff x="0" y="0"/>
+          <a:chExt cx="0" cy="0"/>
+        </a:xfrm>
+      </p:grpSpPr>
+      <p:sp>
+        <p:nvSpPr>
+          <p:cNvPr id="2" name="Title 1"/>
+          <p:cNvSpPr>
+            <a:spLocks noGrp="1"/>
+          </p:cNvSpPr>
+          <p:nvPr>
+            <p:ph type="title"/>
+          </p:nvPr>
+        </p:nvSpPr>
+        <p:spPr/>
+        <p:txBody>
+          <a:bodyPr/>
+          <a:lstStyle/>
+          <a:p>
+            <a:r>
+              <a:rPr lang="en-US" dirty="0"/>
+              <a:t>GRASP Implementation</a:t>
+            </a:r>
+          </a:p>
+        </p:txBody>
+      </p:sp>
+      <p:sp>
+        <p:nvSpPr>
+          <p:cNvPr id="3" name="Content Placeholder 2"/>
+          <p:cNvSpPr>
+            <a:spLocks noGrp="1"/>
+          </p:cNvSpPr>
+          <p:nvPr>
+            <p:ph idx="1"/>
+          </p:nvPr>
+        </p:nvSpPr>
+        <p:spPr/>
+        <p:txBody>
+          <a:bodyPr>
+            <a:normAutofit lnSpcReduction="10000"/>
+          </a:bodyPr>
+          <a:lstStyle/>
+          <a:p>
+            <a:r>
+              <a:rPr lang="en-US" sz="3600" dirty="0"/>
+              <a:t>Focused on low coupling, high cohesion and controller</a:t>
+            </a:r>
+          </a:p>
+          <a:p>
+            <a:pPr lvl="1"/>
+            <a:r>
+              <a:rPr lang="en-US" sz="3600" dirty="0"/>
+              <a:t>Low coupling</a:t>
+            </a:r>
+          </a:p>
+          <a:p>
+            <a:pPr lvl="2"/>
+            <a:r>
+              <a:rPr lang="en-US" sz="3200" dirty="0"/>
+              <a:t>Low amount of intertwined classes </a:t>
+            </a:r>
+          </a:p>
+          <a:p>
+            <a:pPr lvl="1"/>
+            <a:r>
+              <a:rPr lang="en-US" sz="3600" dirty="0"/>
+              <a:t>High Cohesion</a:t>
+            </a:r>
+          </a:p>
+          <a:p>
+            <a:pPr lvl="2"/>
+            <a:r>
+              <a:rPr lang="en-US" sz="3200" dirty="0"/>
+              <a:t>Classes have a specific and narrow focus</a:t>
+            </a:r>
+          </a:p>
+          <a:p>
+            <a:pPr lvl="1"/>
+            <a:r>
+              <a:rPr lang="en-US" sz="3400" dirty="0"/>
+              <a:t>Controller</a:t>
+            </a:r>
+          </a:p>
+          <a:p>
+            <a:pPr lvl="2"/>
+            <a:r>
+              <a:rPr lang="en-US" sz="3200" dirty="0"/>
+              <a:t>Root object that </a:t>
+            </a:r>
+            <a:r>
+              <a:rPr lang="en-US" sz="3200" dirty="0" err="1"/>
+              <a:t>coorindates</a:t>
+            </a:r>
+            <a:r>
+              <a:rPr lang="en-US" sz="3200" dirty="0"/>
+              <a:t> system operation</a:t>
+            </a:r>
+          </a:p>
+          <a:p>
+            <a:endParaRPr lang="en-US" dirty="0"/>
+          </a:p>
+        </p:txBody>
+      </p:sp>
+    </p:spTree>
+    <p:extLst>
+      <p:ext uri="{BB962C8B-B14F-4D97-AF65-F5344CB8AC3E}">
+        <p14:creationId xmlns:p14="http://schemas.microsoft.com/office/powerpoint/2010/main" val="3133455715"/>
+      </p:ext>
+    </p:extLst>
+  </p:cSld>
+  <p:clrMapOvr>
+    <a:masterClrMapping/>
+  </p:clrMapOvr>
+</p:sld>
+</file>
+
+<file path=ppt/slides/slide18.xml><?xml version="1.0" encoding="utf-8"?>
+<p:sld xmlns:a="http://schemas.openxmlformats.org/drawingml/2006/main" xmlns:r="http://schemas.openxmlformats.org/officeDocument/2006/relationships" xmlns:p="http://schemas.openxmlformats.org/presentationml/2006/main">
+  <p:cSld>
+    <p:bg>
+      <p:bgPr>
+        <a:solidFill>
+          <a:schemeClr val="bg1"/>
+        </a:solidFill>
+        <a:effectLst/>
+      </p:bgPr>
+    </p:bg>
+    <p:spTree>
+      <p:nvGrpSpPr>
+        <p:cNvPr id="1" name=""/>
+        <p:cNvGrpSpPr/>
+        <p:nvPr/>
+      </p:nvGrpSpPr>
+      <p:grpSpPr>
+        <a:xfrm>
+          <a:off x="0" y="0"/>
+          <a:ext cx="0" cy="0"/>
+          <a:chOff x="0" y="0"/>
+          <a:chExt cx="0" cy="0"/>
+        </a:xfrm>
+      </p:grpSpPr>
+      <p:sp>
+        <p:nvSpPr>
+          <p:cNvPr id="2" name="Title 1"/>
+          <p:cNvSpPr>
+            <a:spLocks noGrp="1"/>
+          </p:cNvSpPr>
+          <p:nvPr>
+            <p:ph type="title"/>
+          </p:nvPr>
+        </p:nvSpPr>
+        <p:spPr>
+          <a:xfrm>
+            <a:off x="619760" y="764373"/>
+            <a:ext cx="6832600" cy="1293028"/>
+          </a:xfrm>
+        </p:spPr>
+        <p:txBody>
+          <a:bodyPr>
+            <a:normAutofit/>
+          </a:bodyPr>
+          <a:lstStyle/>
+          <a:p>
+            <a:r>
+              <a:rPr lang="en-US" dirty="0"/>
+              <a:t>Test Coverage Summary</a:t>
+            </a:r>
+          </a:p>
+        </p:txBody>
+      </p:sp>
+      <p:sp>
+        <p:nvSpPr>
+          <p:cNvPr id="4" name="Content Placeholder 3">
+            <a:extLst>
+              <a:ext uri="{FF2B5EF4-FFF2-40B4-BE49-F238E27FC236}">
+                <a16:creationId xmlns:a16="http://schemas.microsoft.com/office/drawing/2014/main" id="{31515DDC-D59C-41A2-8ECC-7A394A8DE491}"/>
+              </a:ext>
+            </a:extLst>
+          </p:cNvPr>
+          <p:cNvSpPr>
+            <a:spLocks noGrp="1"/>
+          </p:cNvSpPr>
+          <p:nvPr>
+            <p:ph idx="1"/>
+          </p:nvPr>
+        </p:nvSpPr>
+        <p:spPr>
+          <a:xfrm>
+            <a:off x="619760" y="2194560"/>
+            <a:ext cx="5359009" cy="4024125"/>
+          </a:xfrm>
+        </p:spPr>
+        <p:txBody>
+          <a:bodyPr>
+            <a:normAutofit lnSpcReduction="10000"/>
+          </a:bodyPr>
+          <a:lstStyle/>
+          <a:p>
+            <a:r>
+              <a:rPr lang="en-US" sz="2800" dirty="0"/>
+              <a:t>Test coverage was completed at an average of 99% </a:t>
+            </a:r>
+          </a:p>
+          <a:p>
+            <a:pPr lvl="1"/>
+            <a:r>
+              <a:rPr lang="en-US" sz="2800" dirty="0"/>
+              <a:t>(with the removal for consideration of UI and Controller classes)</a:t>
+            </a:r>
+          </a:p>
+          <a:p>
+            <a:r>
+              <a:rPr lang="en-US" sz="2800" dirty="0"/>
+              <a:t>This was accomplished with strict compliance of separating the UI and domain software layer</a:t>
+            </a:r>
+          </a:p>
+        </p:txBody>
+      </p:sp>
+      <p:pic>
+        <p:nvPicPr>
+          <p:cNvPr id="7" name="Content Placeholder 4">
+            <a:extLst>
+              <a:ext uri="{FF2B5EF4-FFF2-40B4-BE49-F238E27FC236}">
+                <a16:creationId xmlns:a16="http://schemas.microsoft.com/office/drawing/2014/main" id="{CA8610EC-7EF5-4D1F-96DF-074345F90DF5}"/>
+              </a:ext>
+            </a:extLst>
+          </p:cNvPr>
+          <p:cNvPicPr>
+            <a:picLocks noChangeAspect="1"/>
+          </p:cNvPicPr>
+          <p:nvPr/>
+        </p:nvPicPr>
+        <p:blipFill rotWithShape="1">
+          <a:blip r:embed="rId2"/>
+          <a:srcRect r="48570"/>
+          <a:stretch/>
+        </p:blipFill>
+        <p:spPr>
+          <a:xfrm>
+            <a:off x="5978769" y="2279616"/>
+            <a:ext cx="5990879" cy="4076228"/>
+          </a:xfrm>
+          <a:prstGeom prst="rect">
+            <a:avLst/>
+          </a:prstGeom>
+        </p:spPr>
+      </p:pic>
+    </p:spTree>
+    <p:extLst>
+      <p:ext uri="{BB962C8B-B14F-4D97-AF65-F5344CB8AC3E}">
+        <p14:creationId xmlns:p14="http://schemas.microsoft.com/office/powerpoint/2010/main" val="3429186250"/>
       </p:ext>
     </p:extLst>
   </p:cSld>
@@ -6903,111 +7618,6 @@
           <a:chExt cx="0" cy="0"/>
         </a:xfrm>
       </p:grpSpPr>
-      <p:sp useBgFill="1">
-        <p:nvSpPr>
-          <p:cNvPr id="9" name="Rectangle 8">
-            <a:extLst>
-              <a:ext uri="{FF2B5EF4-FFF2-40B4-BE49-F238E27FC236}">
-                <a16:creationId xmlns:a16="http://schemas.microsoft.com/office/drawing/2014/main" id="{CD94F7C0-1344-4B3C-AFCB-E7F006BB5348}"/>
-              </a:ext>
-              <a:ext uri="{C183D7F6-B498-43B3-948B-1728B52AA6E4}">
-                <adec:decorative xmlns:adec="http://schemas.microsoft.com/office/drawing/2017/decorative" val="1"/>
-              </a:ext>
-            </a:extLst>
-          </p:cNvPr>
-          <p:cNvSpPr>
-            <a:spLocks noGrp="1" noRot="1" noChangeAspect="1" noMove="1" noResize="1" noEditPoints="1" noAdjustHandles="1" noChangeArrowheads="1" noChangeShapeType="1" noTextEdit="1"/>
-          </p:cNvSpPr>
-          <p:nvPr>
-            <p:extLst>
-              <p:ext uri="{386F3935-93C4-4BCD-93E2-E3B085C9AB24}">
-                <p16:designElem xmlns:p16="http://schemas.microsoft.com/office/powerpoint/2015/main" val="1"/>
-              </p:ext>
-            </p:extLst>
-          </p:nvPr>
-        </p:nvSpPr>
-        <p:spPr>
-          <a:xfrm>
-            <a:off x="0" y="0"/>
-            <a:ext cx="12192000" cy="6858000"/>
-          </a:xfrm>
-          <a:prstGeom prst="rect">
-            <a:avLst/>
-          </a:prstGeom>
-          <a:ln>
-            <a:noFill/>
-          </a:ln>
-        </p:spPr>
-        <p:style>
-          <a:lnRef idx="2">
-            <a:schemeClr val="accent1">
-              <a:shade val="50000"/>
-            </a:schemeClr>
-          </a:lnRef>
-          <a:fillRef idx="1">
-            <a:schemeClr val="accent1"/>
-          </a:fillRef>
-          <a:effectRef idx="0">
-            <a:schemeClr val="accent1"/>
-          </a:effectRef>
-          <a:fontRef idx="minor">
-            <a:schemeClr val="lt1"/>
-          </a:fontRef>
-        </p:style>
-        <p:txBody>
-          <a:bodyPr rtlCol="0" anchor="ctr"/>
-          <a:lstStyle/>
-          <a:p>
-            <a:pPr algn="ctr"/>
-            <a:endParaRPr lang="en-US"/>
-          </a:p>
-        </p:txBody>
-      </p:sp>
-      <p:pic>
-        <p:nvPicPr>
-          <p:cNvPr id="11" name="Picture 10">
-            <a:extLst>
-              <a:ext uri="{FF2B5EF4-FFF2-40B4-BE49-F238E27FC236}">
-                <a16:creationId xmlns:a16="http://schemas.microsoft.com/office/drawing/2014/main" id="{4EC584A2-4215-4DB8-AE1F-E3768D77E8DE}"/>
-              </a:ext>
-              <a:ext uri="{C183D7F6-B498-43B3-948B-1728B52AA6E4}">
-                <adec:decorative xmlns:adec="http://schemas.microsoft.com/office/drawing/2017/decorative" val="1"/>
-              </a:ext>
-            </a:extLst>
-          </p:cNvPr>
-          <p:cNvPicPr>
-            <a:picLocks noGrp="1" noRot="1" noChangeAspect="1" noMove="1" noResize="1" noEditPoints="1" noAdjustHandles="1" noChangeArrowheads="1" noChangeShapeType="1" noCrop="1"/>
-          </p:cNvPicPr>
-          <p:nvPr>
-            <p:extLst>
-              <p:ext uri="{386F3935-93C4-4BCD-93E2-E3B085C9AB24}">
-                <p16:designElem xmlns:p16="http://schemas.microsoft.com/office/powerpoint/2015/main" val="1"/>
-              </p:ext>
-            </p:extLst>
-          </p:nvPr>
-        </p:nvPicPr>
-        <p:blipFill>
-          <a:blip r:embed="rId2">
-            <a:extLst>
-              <a:ext uri="{28A0092B-C50C-407E-A947-70E740481C1C}">
-                <a14:useLocalDpi xmlns:a14="http://schemas.microsoft.com/office/drawing/2010/main" val="0"/>
-              </a:ext>
-            </a:extLst>
-          </a:blip>
-          <a:stretch>
-            <a:fillRect/>
-          </a:stretch>
-        </p:blipFill>
-        <p:spPr>
-          <a:xfrm>
-            <a:off x="0" y="0"/>
-            <a:ext cx="12192000" cy="1441450"/>
-          </a:xfrm>
-          <a:prstGeom prst="rect">
-            <a:avLst/>
-          </a:prstGeom>
-        </p:spPr>
-      </p:pic>
       <p:sp>
         <p:nvSpPr>
           <p:cNvPr id="2" name="Title 1">
@@ -7106,7 +7716,7 @@
           <p:nvPr/>
         </p:nvPicPr>
         <p:blipFill>
-          <a:blip r:embed="rId3"/>
+          <a:blip r:embed="rId2"/>
           <a:stretch>
             <a:fillRect/>
           </a:stretch>
@@ -7136,7 +7746,7 @@
           <p:nvPr/>
         </p:nvPicPr>
         <p:blipFill>
-          <a:blip r:embed="rId4"/>
+          <a:blip r:embed="rId3"/>
           <a:stretch>
             <a:fillRect/>
           </a:stretch>
@@ -7605,159 +8215,6 @@
           <a:chExt cx="0" cy="0"/>
         </a:xfrm>
       </p:grpSpPr>
-      <p:pic>
-        <p:nvPicPr>
-          <p:cNvPr id="9" name="Picture 8">
-            <a:extLst>
-              <a:ext uri="{FF2B5EF4-FFF2-40B4-BE49-F238E27FC236}">
-                <a16:creationId xmlns:a16="http://schemas.microsoft.com/office/drawing/2014/main" id="{BDFADFB3-3D44-49A8-AE3B-A87C61607F7E}"/>
-              </a:ext>
-              <a:ext uri="{C183D7F6-B498-43B3-948B-1728B52AA6E4}">
-                <adec:decorative xmlns:adec="http://schemas.microsoft.com/office/drawing/2017/decorative" val="1"/>
-              </a:ext>
-            </a:extLst>
-          </p:cNvPr>
-          <p:cNvPicPr>
-            <a:picLocks noGrp="1" noRot="1" noChangeAspect="1" noMove="1" noResize="1" noEditPoints="1" noAdjustHandles="1" noChangeArrowheads="1" noChangeShapeType="1" noCrop="1"/>
-          </p:cNvPicPr>
-          <p:nvPr>
-            <p:extLst>
-              <p:ext uri="{386F3935-93C4-4BCD-93E2-E3B085C9AB24}">
-                <p16:designElem xmlns:p16="http://schemas.microsoft.com/office/powerpoint/2015/main" val="1"/>
-              </p:ext>
-            </p:extLst>
-          </p:nvPr>
-        </p:nvPicPr>
-        <p:blipFill>
-          <a:blip r:embed="rId2">
-            <a:extLst>
-              <a:ext uri="{28A0092B-C50C-407E-A947-70E740481C1C}">
-                <a14:useLocalDpi xmlns:a14="http://schemas.microsoft.com/office/drawing/2010/main" val="0"/>
-              </a:ext>
-            </a:extLst>
-          </a:blip>
-          <a:stretch>
-            <a:fillRect/>
-          </a:stretch>
-        </p:blipFill>
-        <p:spPr>
-          <a:xfrm>
-            <a:off x="0" y="0"/>
-            <a:ext cx="12192000" cy="1441450"/>
-          </a:xfrm>
-          <a:prstGeom prst="rect">
-            <a:avLst/>
-          </a:prstGeom>
-        </p:spPr>
-      </p:pic>
-      <p:pic>
-        <p:nvPicPr>
-          <p:cNvPr id="11" name="Picture 10">
-            <a:extLst>
-              <a:ext uri="{FF2B5EF4-FFF2-40B4-BE49-F238E27FC236}">
-                <a16:creationId xmlns:a16="http://schemas.microsoft.com/office/drawing/2014/main" id="{BB912AE0-CAD9-4F8F-A2A2-BDF07D4EDD22}"/>
-              </a:ext>
-              <a:ext uri="{C183D7F6-B498-43B3-948B-1728B52AA6E4}">
-                <adec:decorative xmlns:adec="http://schemas.microsoft.com/office/drawing/2017/decorative" val="1"/>
-              </a:ext>
-            </a:extLst>
-          </p:cNvPr>
-          <p:cNvPicPr>
-            <a:picLocks noGrp="1" noRot="1" noChangeAspect="1" noMove="1" noResize="1" noEditPoints="1" noAdjustHandles="1" noChangeArrowheads="1" noChangeShapeType="1" noCrop="1"/>
-          </p:cNvPicPr>
-          <p:nvPr>
-            <p:extLst>
-              <p:ext uri="{386F3935-93C4-4BCD-93E2-E3B085C9AB24}">
-                <p16:designElem xmlns:p16="http://schemas.microsoft.com/office/powerpoint/2015/main" val="1"/>
-              </p:ext>
-            </p:extLst>
-          </p:nvPr>
-        </p:nvPicPr>
-        <p:blipFill>
-          <a:blip r:embed="rId3">
-            <a:extLst>
-              <a:ext uri="{28A0092B-C50C-407E-A947-70E740481C1C}">
-                <a14:useLocalDpi xmlns:a14="http://schemas.microsoft.com/office/drawing/2010/main" val="0"/>
-              </a:ext>
-            </a:extLst>
-          </a:blip>
-          <a:stretch>
-            <a:fillRect/>
-          </a:stretch>
-        </p:blipFill>
-        <p:spPr>
-          <a:xfrm>
-            <a:off x="0" y="4375150"/>
-            <a:ext cx="12192000" cy="2482850"/>
-          </a:xfrm>
-          <a:prstGeom prst="rect">
-            <a:avLst/>
-          </a:prstGeom>
-        </p:spPr>
-      </p:pic>
-      <p:sp>
-        <p:nvSpPr>
-          <p:cNvPr id="13" name="Rectangle 12">
-            <a:extLst>
-              <a:ext uri="{FF2B5EF4-FFF2-40B4-BE49-F238E27FC236}">
-                <a16:creationId xmlns:a16="http://schemas.microsoft.com/office/drawing/2014/main" id="{674220BB-5395-4F54-8045-343633A1BC8A}"/>
-              </a:ext>
-              <a:ext uri="{C183D7F6-B498-43B3-948B-1728B52AA6E4}">
-                <adec:decorative xmlns:adec="http://schemas.microsoft.com/office/drawing/2017/decorative" val="1"/>
-              </a:ext>
-            </a:extLst>
-          </p:cNvPr>
-          <p:cNvSpPr>
-            <a:spLocks noGrp="1" noRot="1" noChangeAspect="1" noMove="1" noResize="1" noEditPoints="1" noAdjustHandles="1" noChangeArrowheads="1" noChangeShapeType="1" noTextEdit="1"/>
-          </p:cNvSpPr>
-          <p:nvPr>
-            <p:extLst>
-              <p:ext uri="{386F3935-93C4-4BCD-93E2-E3B085C9AB24}">
-                <p16:designElem xmlns:p16="http://schemas.microsoft.com/office/powerpoint/2015/main" val="1"/>
-              </p:ext>
-            </p:extLst>
-          </p:nvPr>
-        </p:nvSpPr>
-        <p:spPr>
-          <a:xfrm>
-            <a:off x="7946782" y="-1"/>
-            <a:ext cx="4245218" cy="6858001"/>
-          </a:xfrm>
-          <a:prstGeom prst="rect">
-            <a:avLst/>
-          </a:prstGeom>
-          <a:solidFill>
-            <a:schemeClr val="tx1"/>
-          </a:solidFill>
-          <a:ln>
-            <a:noFill/>
-          </a:ln>
-        </p:spPr>
-        <p:style>
-          <a:lnRef idx="2">
-            <a:schemeClr val="accent1">
-              <a:shade val="50000"/>
-            </a:schemeClr>
-          </a:lnRef>
-          <a:fillRef idx="1">
-            <a:schemeClr val="accent1"/>
-          </a:fillRef>
-          <a:effectRef idx="0">
-            <a:schemeClr val="accent1"/>
-          </a:effectRef>
-          <a:fontRef idx="minor">
-            <a:schemeClr val="lt1"/>
-          </a:fontRef>
-        </p:style>
-        <p:txBody>
-          <a:bodyPr rtlCol="0" anchor="ctr"/>
-          <a:lstStyle/>
-          <a:p>
-            <a:pPr algn="ctr"/>
-            <a:endParaRPr lang="en-US"/>
-          </a:p>
-        </p:txBody>
-      </p:sp>
       <p:sp>
         <p:nvSpPr>
           <p:cNvPr id="2" name="Title 1"/>
@@ -7794,181 +8251,6 @@
               </a:rPr>
               <a:t>Domain Class Diagram</a:t>
             </a:r>
-          </a:p>
-        </p:txBody>
-      </p:sp>
-      <p:pic>
-        <p:nvPicPr>
-          <p:cNvPr id="15" name="Picture 14">
-            <a:extLst>
-              <a:ext uri="{FF2B5EF4-FFF2-40B4-BE49-F238E27FC236}">
-                <a16:creationId xmlns:a16="http://schemas.microsoft.com/office/drawing/2014/main" id="{9D892AF3-0287-4CB0-AD2F-775B64C6FDA5}"/>
-              </a:ext>
-              <a:ext uri="{C183D7F6-B498-43B3-948B-1728B52AA6E4}">
-                <adec:decorative xmlns:adec="http://schemas.microsoft.com/office/drawing/2017/decorative" val="1"/>
-              </a:ext>
-            </a:extLst>
-          </p:cNvPr>
-          <p:cNvPicPr>
-            <a:picLocks noGrp="1" noRot="1" noChangeAspect="1" noMove="1" noResize="1" noEditPoints="1" noAdjustHandles="1" noChangeArrowheads="1" noChangeShapeType="1" noCrop="1"/>
-          </p:cNvPicPr>
-          <p:nvPr>
-            <p:extLst>
-              <p:ext uri="{386F3935-93C4-4BCD-93E2-E3B085C9AB24}">
-                <p16:designElem xmlns:p16="http://schemas.microsoft.com/office/powerpoint/2015/main" val="1"/>
-              </p:ext>
-            </p:extLst>
-          </p:nvPr>
-        </p:nvPicPr>
-        <p:blipFill>
-          <a:blip r:embed="rId3">
-            <a:extLst>
-              <a:ext uri="{28A0092B-C50C-407E-A947-70E740481C1C}">
-                <a14:useLocalDpi xmlns:a14="http://schemas.microsoft.com/office/drawing/2010/main" val="0"/>
-              </a:ext>
-            </a:extLst>
-          </a:blip>
-          <a:stretch>
-            <a:fillRect/>
-          </a:stretch>
-        </p:blipFill>
-        <p:spPr>
-          <a:xfrm>
-            <a:off x="0" y="4375150"/>
-            <a:ext cx="12192000" cy="2482850"/>
-          </a:xfrm>
-          <a:prstGeom prst="rect">
-            <a:avLst/>
-          </a:prstGeom>
-        </p:spPr>
-      </p:pic>
-      <p:sp>
-        <p:nvSpPr>
-          <p:cNvPr id="17" name="Rectangle 16">
-            <a:extLst>
-              <a:ext uri="{FF2B5EF4-FFF2-40B4-BE49-F238E27FC236}">
-                <a16:creationId xmlns:a16="http://schemas.microsoft.com/office/drawing/2014/main" id="{D477AA7E-6F59-438B-AE81-F002D625899E}"/>
-              </a:ext>
-              <a:ext uri="{C183D7F6-B498-43B3-948B-1728B52AA6E4}">
-                <adec:decorative xmlns:adec="http://schemas.microsoft.com/office/drawing/2017/decorative" val="1"/>
-              </a:ext>
-            </a:extLst>
-          </p:cNvPr>
-          <p:cNvSpPr>
-            <a:spLocks noGrp="1" noRot="1" noChangeAspect="1" noMove="1" noResize="1" noEditPoints="1" noAdjustHandles="1" noChangeArrowheads="1" noChangeShapeType="1" noTextEdit="1"/>
-          </p:cNvSpPr>
-          <p:nvPr>
-            <p:extLst>
-              <p:ext uri="{386F3935-93C4-4BCD-93E2-E3B085C9AB24}">
-                <p16:designElem xmlns:p16="http://schemas.microsoft.com/office/powerpoint/2015/main" val="1"/>
-              </p:ext>
-            </p:extLst>
-          </p:nvPr>
-        </p:nvSpPr>
-        <p:spPr>
-          <a:xfrm>
-            <a:off x="-1" y="0"/>
-            <a:ext cx="7946781" cy="6858000"/>
-          </a:xfrm>
-          <a:prstGeom prst="rect">
-            <a:avLst/>
-          </a:prstGeom>
-          <a:solidFill>
-            <a:schemeClr val="tx1"/>
-          </a:solidFill>
-          <a:ln>
-            <a:noFill/>
-          </a:ln>
-        </p:spPr>
-        <p:style>
-          <a:lnRef idx="2">
-            <a:schemeClr val="accent1">
-              <a:shade val="50000"/>
-            </a:schemeClr>
-          </a:lnRef>
-          <a:fillRef idx="1">
-            <a:schemeClr val="accent1"/>
-          </a:fillRef>
-          <a:effectRef idx="0">
-            <a:schemeClr val="accent1"/>
-          </a:effectRef>
-          <a:fontRef idx="minor">
-            <a:schemeClr val="lt1"/>
-          </a:fontRef>
-        </p:style>
-        <p:txBody>
-          <a:bodyPr rtlCol="0" anchor="ctr"/>
-          <a:lstStyle/>
-          <a:p>
-            <a:pPr algn="ctr"/>
-            <a:endParaRPr lang="en-US"/>
-          </a:p>
-        </p:txBody>
-      </p:sp>
-      <p:sp useBgFill="1">
-        <p:nvSpPr>
-          <p:cNvPr id="19" name="Rounded Rectangle 11">
-            <a:extLst>
-              <a:ext uri="{FF2B5EF4-FFF2-40B4-BE49-F238E27FC236}">
-                <a16:creationId xmlns:a16="http://schemas.microsoft.com/office/drawing/2014/main" id="{C84439A1-773C-4E21-A179-0417A18640E9}"/>
-              </a:ext>
-              <a:ext uri="{C183D7F6-B498-43B3-948B-1728B52AA6E4}">
-                <adec:decorative xmlns:adec="http://schemas.microsoft.com/office/drawing/2017/decorative" val="1"/>
-              </a:ext>
-            </a:extLst>
-          </p:cNvPr>
-          <p:cNvSpPr>
-            <a:spLocks noGrp="1" noRot="1" noChangeAspect="1" noMove="1" noResize="1" noEditPoints="1" noAdjustHandles="1" noChangeArrowheads="1" noChangeShapeType="1" noTextEdit="1"/>
-          </p:cNvSpPr>
-          <p:nvPr>
-            <p:extLst>
-              <p:ext uri="{386F3935-93C4-4BCD-93E2-E3B085C9AB24}">
-                <p16:designElem xmlns:p16="http://schemas.microsoft.com/office/powerpoint/2015/main" val="1"/>
-              </p:ext>
-            </p:extLst>
-          </p:nvPr>
-        </p:nvSpPr>
-        <p:spPr>
-          <a:xfrm>
-            <a:off x="643338" y="643464"/>
-            <a:ext cx="6638814" cy="5571072"/>
-          </a:xfrm>
-          <a:prstGeom prst="roundRect">
-            <a:avLst>
-              <a:gd name="adj" fmla="val 2403"/>
-            </a:avLst>
-          </a:prstGeom>
-          <a:ln>
-            <a:noFill/>
-          </a:ln>
-          <a:effectLst>
-            <a:innerShdw blurRad="114300">
-              <a:prstClr val="black"/>
-            </a:innerShdw>
-          </a:effectLst>
-        </p:spPr>
-        <p:style>
-          <a:lnRef idx="2">
-            <a:schemeClr val="accent1">
-              <a:shade val="50000"/>
-            </a:schemeClr>
-          </a:lnRef>
-          <a:fillRef idx="1">
-            <a:schemeClr val="accent1"/>
-          </a:fillRef>
-          <a:effectRef idx="0">
-            <a:schemeClr val="accent1"/>
-          </a:effectRef>
-          <a:fontRef idx="minor">
-            <a:schemeClr val="lt1"/>
-          </a:fontRef>
-        </p:style>
-        <p:txBody>
-          <a:bodyPr rtlCol="0" anchor="ctr"/>
-          <a:lstStyle/>
-          <a:p>
-            <a:pPr algn="ctr"/>
-            <a:endParaRPr lang="en-US"/>
           </a:p>
         </p:txBody>
       </p:sp>
@@ -7981,7 +8263,7 @@
           <p:nvPr/>
         </p:nvPicPr>
         <p:blipFill>
-          <a:blip r:embed="rId4"/>
+          <a:blip r:embed="rId2"/>
           <a:stretch>
             <a:fillRect/>
           </a:stretch>
@@ -8034,331 +8316,12 @@
           <a:chExt cx="0" cy="0"/>
         </a:xfrm>
       </p:grpSpPr>
-      <p:sp useBgFill="1">
-        <p:nvSpPr>
-          <p:cNvPr id="13" name="Rounded Rectangle 14">
+      <p:pic>
+        <p:nvPicPr>
+          <p:cNvPr id="7" name="Picture 6">
             <a:extLst>
               <a:ext uri="{FF2B5EF4-FFF2-40B4-BE49-F238E27FC236}">
-                <a16:creationId xmlns:a16="http://schemas.microsoft.com/office/drawing/2014/main" id="{1FDFF85F-F105-40D5-9793-90419158C3BD}"/>
-              </a:ext>
-              <a:ext uri="{C183D7F6-B498-43B3-948B-1728B52AA6E4}">
-                <adec:decorative xmlns:adec="http://schemas.microsoft.com/office/drawing/2017/decorative" val="1"/>
-              </a:ext>
-            </a:extLst>
-          </p:cNvPr>
-          <p:cNvSpPr>
-            <a:spLocks noGrp="1" noRot="1" noChangeAspect="1" noMove="1" noResize="1" noEditPoints="1" noAdjustHandles="1" noChangeArrowheads="1" noChangeShapeType="1" noTextEdit="1"/>
-          </p:cNvSpPr>
-          <p:nvPr>
-            <p:extLst>
-              <p:ext uri="{386F3935-93C4-4BCD-93E2-E3B085C9AB24}">
-                <p16:designElem xmlns:p16="http://schemas.microsoft.com/office/powerpoint/2015/main" val="1"/>
-              </p:ext>
-            </p:extLst>
-          </p:nvPr>
-        </p:nvSpPr>
-        <p:spPr>
-          <a:xfrm>
-            <a:off x="4636008" y="0"/>
-            <a:ext cx="7555992" cy="6858000"/>
-          </a:xfrm>
-          <a:prstGeom prst="roundRect">
-            <a:avLst>
-              <a:gd name="adj" fmla="val 0"/>
-            </a:avLst>
-          </a:prstGeom>
-          <a:ln>
-            <a:noFill/>
-          </a:ln>
-          <a:effectLst/>
-        </p:spPr>
-        <p:style>
-          <a:lnRef idx="2">
-            <a:schemeClr val="accent1">
-              <a:shade val="50000"/>
-            </a:schemeClr>
-          </a:lnRef>
-          <a:fillRef idx="1">
-            <a:schemeClr val="accent1"/>
-          </a:fillRef>
-          <a:effectRef idx="0">
-            <a:schemeClr val="accent1"/>
-          </a:effectRef>
-          <a:fontRef idx="minor">
-            <a:schemeClr val="lt1"/>
-          </a:fontRef>
-        </p:style>
-        <p:txBody>
-          <a:bodyPr rtlCol="0" anchor="ctr"/>
-          <a:lstStyle/>
-          <a:p>
-            <a:pPr marL="0" marR="0" lvl="0" indent="0" algn="ctr" defTabSz="457200" rtl="0" eaLnBrk="1" fontAlgn="auto" latinLnBrk="0" hangingPunct="1">
-              <a:lnSpc>
-                <a:spcPct val="100000"/>
-              </a:lnSpc>
-              <a:spcBef>
-                <a:spcPts val="0"/>
-              </a:spcBef>
-              <a:spcAft>
-                <a:spcPts val="0"/>
-              </a:spcAft>
-              <a:buClrTx/>
-              <a:buSzTx/>
-              <a:buFontTx/>
-              <a:buNone/>
-              <a:tabLst/>
-              <a:defRPr/>
-            </a:pPr>
-            <a:endParaRPr kumimoji="0" lang="en-US" sz="1800" b="0" i="0" u="none" strike="noStrike" kern="1200" cap="none" spc="0" normalizeH="0" baseline="0" noProof="0">
-              <a:ln>
-                <a:noFill/>
-              </a:ln>
-              <a:solidFill>
-                <a:prstClr val="white"/>
-              </a:solidFill>
-              <a:effectLst/>
-              <a:uLnTx/>
-              <a:uFillTx/>
-              <a:latin typeface="Century Gothic" panose="020B0502020202020204"/>
-              <a:ea typeface="+mn-ea"/>
-              <a:cs typeface="+mn-cs"/>
-            </a:endParaRPr>
-          </a:p>
-        </p:txBody>
-      </p:sp>
-      <p:sp>
-        <p:nvSpPr>
-          <p:cNvPr id="15" name="Rectangle 14">
-            <a:extLst>
-              <a:ext uri="{FF2B5EF4-FFF2-40B4-BE49-F238E27FC236}">
-                <a16:creationId xmlns:a16="http://schemas.microsoft.com/office/drawing/2014/main" id="{35AB47A4-BA8C-4250-88BD-D49C68C5F9E9}"/>
-              </a:ext>
-              <a:ext uri="{C183D7F6-B498-43B3-948B-1728B52AA6E4}">
-                <adec:decorative xmlns:adec="http://schemas.microsoft.com/office/drawing/2017/decorative" val="1"/>
-              </a:ext>
-            </a:extLst>
-          </p:cNvPr>
-          <p:cNvSpPr>
-            <a:spLocks noGrp="1" noRot="1" noChangeAspect="1" noMove="1" noResize="1" noEditPoints="1" noAdjustHandles="1" noChangeArrowheads="1" noChangeShapeType="1" noTextEdit="1"/>
-          </p:cNvSpPr>
-          <p:nvPr>
-            <p:extLst>
-              <p:ext uri="{386F3935-93C4-4BCD-93E2-E3B085C9AB24}">
-                <p16:designElem xmlns:p16="http://schemas.microsoft.com/office/powerpoint/2015/main" val="1"/>
-              </p:ext>
-            </p:extLst>
-          </p:nvPr>
-        </p:nvSpPr>
-        <p:spPr>
-          <a:xfrm>
-            <a:off x="0" y="0"/>
-            <a:ext cx="4636008" cy="6858000"/>
-          </a:xfrm>
-          <a:prstGeom prst="rect">
-            <a:avLst/>
-          </a:prstGeom>
-          <a:solidFill>
-            <a:schemeClr val="tx1"/>
-          </a:solidFill>
-          <a:ln>
-            <a:noFill/>
-          </a:ln>
-          <a:effectLst>
-            <a:outerShdw blurRad="63500" dist="38100" algn="l" rotWithShape="0">
-              <a:prstClr val="black">
-                <a:alpha val="40000"/>
-              </a:prstClr>
-            </a:outerShdw>
-          </a:effectLst>
-        </p:spPr>
-        <p:style>
-          <a:lnRef idx="2">
-            <a:schemeClr val="accent1">
-              <a:shade val="50000"/>
-            </a:schemeClr>
-          </a:lnRef>
-          <a:fillRef idx="1">
-            <a:schemeClr val="accent1"/>
-          </a:fillRef>
-          <a:effectRef idx="0">
-            <a:schemeClr val="accent1"/>
-          </a:effectRef>
-          <a:fontRef idx="minor">
-            <a:schemeClr val="lt1"/>
-          </a:fontRef>
-        </p:style>
-        <p:txBody>
-          <a:bodyPr rtlCol="0" anchor="ctr"/>
-          <a:lstStyle/>
-          <a:p>
-            <a:pPr marL="0" marR="0" lvl="0" indent="0" algn="ctr" defTabSz="457200" rtl="0" eaLnBrk="1" fontAlgn="auto" latinLnBrk="0" hangingPunct="1">
-              <a:lnSpc>
-                <a:spcPct val="100000"/>
-              </a:lnSpc>
-              <a:spcBef>
-                <a:spcPts val="0"/>
-              </a:spcBef>
-              <a:spcAft>
-                <a:spcPts val="0"/>
-              </a:spcAft>
-              <a:buClrTx/>
-              <a:buSzTx/>
-              <a:buFontTx/>
-              <a:buNone/>
-              <a:tabLst/>
-              <a:defRPr/>
-            </a:pPr>
-            <a:endParaRPr kumimoji="0" lang="en-US" sz="1800" b="0" i="0" u="none" strike="noStrike" kern="1200" cap="none" spc="0" normalizeH="0" baseline="0" noProof="0">
-              <a:ln>
-                <a:noFill/>
-              </a:ln>
-              <a:solidFill>
-                <a:prstClr val="white"/>
-              </a:solidFill>
-              <a:effectLst/>
-              <a:uLnTx/>
-              <a:uFillTx/>
-              <a:latin typeface="Century Gothic" panose="020B0502020202020204"/>
-              <a:ea typeface="+mn-ea"/>
-              <a:cs typeface="+mn-cs"/>
-            </a:endParaRPr>
-          </a:p>
-        </p:txBody>
-      </p:sp>
-      <p:pic>
-        <p:nvPicPr>
-          <p:cNvPr id="17" name="Picture 16">
-            <a:extLst>
-              <a:ext uri="{FF2B5EF4-FFF2-40B4-BE49-F238E27FC236}">
-                <a16:creationId xmlns:a16="http://schemas.microsoft.com/office/drawing/2014/main" id="{66C8958D-EB99-414F-B735-863B67BB14D3}"/>
-              </a:ext>
-              <a:ext uri="{C183D7F6-B498-43B3-948B-1728B52AA6E4}">
-                <adec:decorative xmlns:adec="http://schemas.microsoft.com/office/drawing/2017/decorative" val="1"/>
-              </a:ext>
-            </a:extLst>
-          </p:cNvPr>
-          <p:cNvPicPr>
-            <a:picLocks noGrp="1" noRot="1" noChangeAspect="1" noMove="1" noResize="1" noEditPoints="1" noAdjustHandles="1" noChangeArrowheads="1" noChangeShapeType="1" noCrop="1"/>
-          </p:cNvPicPr>
-          <p:nvPr>
-            <p:extLst>
-              <p:ext uri="{386F3935-93C4-4BCD-93E2-E3B085C9AB24}">
-                <p16:designElem xmlns:p16="http://schemas.microsoft.com/office/powerpoint/2015/main" val="1"/>
-              </p:ext>
-            </p:extLst>
-          </p:nvPr>
-        </p:nvPicPr>
-        <p:blipFill rotWithShape="1">
-          <a:blip r:embed="rId2">
-            <a:extLst>
-              <a:ext uri="{28A0092B-C50C-407E-A947-70E740481C1C}">
-                <a14:useLocalDpi xmlns:a14="http://schemas.microsoft.com/office/drawing/2010/main" val="0"/>
-              </a:ext>
-            </a:extLst>
-          </a:blip>
-          <a:srcRect r="61975"/>
-          <a:stretch/>
-        </p:blipFill>
-        <p:spPr>
-          <a:xfrm>
-            <a:off x="0" y="0"/>
-            <a:ext cx="4636008" cy="1441450"/>
-          </a:xfrm>
-          <a:prstGeom prst="rect">
-            <a:avLst/>
-          </a:prstGeom>
-        </p:spPr>
-      </p:pic>
-      <p:sp>
-        <p:nvSpPr>
-          <p:cNvPr id="2" name="Title 1">
-            <a:extLst>
-              <a:ext uri="{FF2B5EF4-FFF2-40B4-BE49-F238E27FC236}">
-                <a16:creationId xmlns:a16="http://schemas.microsoft.com/office/drawing/2014/main" id="{E9E2039E-AF91-4088-9859-E2B238638AA8}"/>
-              </a:ext>
-            </a:extLst>
-          </p:cNvPr>
-          <p:cNvSpPr>
-            <a:spLocks noGrp="1"/>
-          </p:cNvSpPr>
-          <p:nvPr>
-            <p:ph type="title"/>
-          </p:nvPr>
-        </p:nvSpPr>
-        <p:spPr>
-          <a:xfrm>
-            <a:off x="0" y="764373"/>
-            <a:ext cx="2498710" cy="4314064"/>
-          </a:xfrm>
-        </p:spPr>
-        <p:txBody>
-          <a:bodyPr>
-            <a:normAutofit/>
-          </a:bodyPr>
-          <a:lstStyle/>
-          <a:p>
-            <a:pPr algn="l"/>
-            <a:r>
-              <a:rPr lang="en-US" sz="3600" dirty="0">
-                <a:solidFill>
-                  <a:schemeClr val="bg1"/>
-                </a:solidFill>
-              </a:rPr>
-              <a:t>UML Class Diagram</a:t>
-            </a:r>
-          </a:p>
-        </p:txBody>
-      </p:sp>
-      <p:pic>
-        <p:nvPicPr>
-          <p:cNvPr id="19" name="Picture 18">
-            <a:extLst>
-              <a:ext uri="{FF2B5EF4-FFF2-40B4-BE49-F238E27FC236}">
-                <a16:creationId xmlns:a16="http://schemas.microsoft.com/office/drawing/2014/main" id="{39E5F3CB-7BDD-4E64-B274-CD900F08C6F3}"/>
-              </a:ext>
-              <a:ext uri="{C183D7F6-B498-43B3-948B-1728B52AA6E4}">
-                <adec:decorative xmlns:adec="http://schemas.microsoft.com/office/drawing/2017/decorative" val="1"/>
-              </a:ext>
-            </a:extLst>
-          </p:cNvPr>
-          <p:cNvPicPr>
-            <a:picLocks noGrp="1" noRot="1" noChangeAspect="1" noMove="1" noResize="1" noEditPoints="1" noAdjustHandles="1" noChangeArrowheads="1" noChangeShapeType="1" noCrop="1"/>
-          </p:cNvPicPr>
-          <p:nvPr>
-            <p:extLst>
-              <p:ext uri="{386F3935-93C4-4BCD-93E2-E3B085C9AB24}">
-                <p16:designElem xmlns:p16="http://schemas.microsoft.com/office/powerpoint/2015/main" val="1"/>
-              </p:ext>
-            </p:extLst>
-          </p:nvPr>
-        </p:nvPicPr>
-        <p:blipFill rotWithShape="1">
-          <a:blip r:embed="rId3">
-            <a:extLst>
-              <a:ext uri="{28A0092B-C50C-407E-A947-70E740481C1C}">
-                <a14:useLocalDpi xmlns:a14="http://schemas.microsoft.com/office/drawing/2010/main" val="0"/>
-              </a:ext>
-            </a:extLst>
-          </a:blip>
-          <a:srcRect r="61975"/>
-          <a:stretch/>
-        </p:blipFill>
-        <p:spPr>
-          <a:xfrm>
-            <a:off x="0" y="4375150"/>
-            <a:ext cx="4636008" cy="2482850"/>
-          </a:xfrm>
-          <a:prstGeom prst="rect">
-            <a:avLst/>
-          </a:prstGeom>
-        </p:spPr>
-      </p:pic>
-      <p:pic>
-        <p:nvPicPr>
-          <p:cNvPr id="8" name="Content Placeholder 4">
-            <a:extLst>
-              <a:ext uri="{FF2B5EF4-FFF2-40B4-BE49-F238E27FC236}">
-                <a16:creationId xmlns:a16="http://schemas.microsoft.com/office/drawing/2014/main" id="{B9DBB4AF-CFD8-4FF6-8E73-CEE4A7FD8B10}"/>
+                <a16:creationId xmlns:a16="http://schemas.microsoft.com/office/drawing/2014/main" id="{06004AD9-C743-443E-9E2C-29D0FC4E7F48}"/>
               </a:ext>
             </a:extLst>
           </p:cNvPr>
@@ -8367,16 +8330,15 @@
           </p:cNvPicPr>
           <p:nvPr/>
         </p:nvPicPr>
-        <p:blipFill>
-          <a:blip r:embed="rId4"/>
-          <a:stretch>
-            <a:fillRect/>
-          </a:stretch>
+        <p:blipFill rotWithShape="1">
+          <a:blip r:embed="rId2"/>
+          <a:srcRect r="80383" b="74419"/>
+          <a:stretch/>
         </p:blipFill>
         <p:spPr>
           <a:xfrm>
-            <a:off x="2498710" y="0"/>
-            <a:ext cx="9693290" cy="6858000"/>
+            <a:off x="2690843" y="304900"/>
+            <a:ext cx="6944187" cy="6248200"/>
           </a:xfrm>
           <a:prstGeom prst="rect">
             <a:avLst/>
@@ -8391,7 +8353,7 @@
     </p:extLst>
   </p:cSld>
   <p:clrMapOvr>
-    <a:overrideClrMapping bg1="lt1" tx1="dk1" bg2="lt2" tx2="dk2" accent1="accent1" accent2="accent2" accent3="accent3" accent4="accent4" accent5="accent5" accent6="accent6" hlink="hlink" folHlink="folHlink"/>
+    <a:masterClrMapping/>
   </p:clrMapOvr>
 </p:sld>
 </file>
@@ -8399,6 +8361,14 @@
 <file path=ppt/slides/slide7.xml><?xml version="1.0" encoding="utf-8"?>
 <p:sld xmlns:a="http://schemas.openxmlformats.org/drawingml/2006/main" xmlns:r="http://schemas.openxmlformats.org/officeDocument/2006/relationships" xmlns:p="http://schemas.openxmlformats.org/presentationml/2006/main">
   <p:cSld>
+    <p:bg>
+      <p:bgPr>
+        <a:solidFill>
+          <a:schemeClr val="bg1"/>
+        </a:solidFill>
+        <a:effectLst/>
+      </p:bgPr>
+    </p:bg>
     <p:spTree>
       <p:nvGrpSpPr>
         <p:cNvPr id="1" name=""/>
@@ -8413,51 +8383,39 @@
           <a:chExt cx="0" cy="0"/>
         </a:xfrm>
       </p:grpSpPr>
-      <p:sp>
-        <p:nvSpPr>
-          <p:cNvPr id="2" name="Title 1"/>
-          <p:cNvSpPr>
-            <a:spLocks noGrp="1"/>
-          </p:cNvSpPr>
-          <p:nvPr>
-            <p:ph type="title"/>
-          </p:nvPr>
-        </p:nvSpPr>
-        <p:spPr/>
-        <p:txBody>
-          <a:bodyPr/>
-          <a:lstStyle/>
-          <a:p>
-            <a:r>
-              <a:rPr lang="en-US" dirty="0"/>
-              <a:t>Example &amp; Program Operation</a:t>
-            </a:r>
-          </a:p>
-        </p:txBody>
-      </p:sp>
-      <p:sp>
-        <p:nvSpPr>
-          <p:cNvPr id="3" name="Content Placeholder 2"/>
-          <p:cNvSpPr>
-            <a:spLocks noGrp="1"/>
-          </p:cNvSpPr>
-          <p:nvPr>
-            <p:ph idx="1"/>
-          </p:nvPr>
-        </p:nvSpPr>
-        <p:spPr/>
-        <p:txBody>
-          <a:bodyPr/>
-          <a:lstStyle/>
-          <a:p>
-            <a:endParaRPr lang="en-US" dirty="0"/>
-          </a:p>
-        </p:txBody>
-      </p:sp>
+      <p:pic>
+        <p:nvPicPr>
+          <p:cNvPr id="2" name="Picture 1">
+            <a:extLst>
+              <a:ext uri="{FF2B5EF4-FFF2-40B4-BE49-F238E27FC236}">
+                <a16:creationId xmlns:a16="http://schemas.microsoft.com/office/drawing/2014/main" id="{7BAB4B3F-9CF5-4D71-8F9D-78A57147D1AF}"/>
+              </a:ext>
+            </a:extLst>
+          </p:cNvPr>
+          <p:cNvPicPr>
+            <a:picLocks noChangeAspect="1"/>
+          </p:cNvPicPr>
+          <p:nvPr/>
+        </p:nvPicPr>
+        <p:blipFill rotWithShape="1">
+          <a:blip r:embed="rId2"/>
+          <a:srcRect l="21501" t="71966" r="54842"/>
+          <a:stretch/>
+        </p:blipFill>
+        <p:spPr>
+          <a:xfrm>
+            <a:off x="2278911" y="312755"/>
+            <a:ext cx="7634177" cy="6232489"/>
+          </a:xfrm>
+          <a:prstGeom prst="rect">
+            <a:avLst/>
+          </a:prstGeom>
+        </p:spPr>
+      </p:pic>
     </p:spTree>
     <p:extLst>
       <p:ext uri="{BB962C8B-B14F-4D97-AF65-F5344CB8AC3E}">
-        <p14:creationId xmlns:p14="http://schemas.microsoft.com/office/powerpoint/2010/main" val="1434726496"/>
+        <p14:creationId xmlns:p14="http://schemas.microsoft.com/office/powerpoint/2010/main" val="2616524720"/>
       </p:ext>
     </p:extLst>
   </p:cSld>
@@ -8470,6 +8428,14 @@
 <file path=ppt/slides/slide8.xml><?xml version="1.0" encoding="utf-8"?>
 <p:sld xmlns:a="http://schemas.openxmlformats.org/drawingml/2006/main" xmlns:r="http://schemas.openxmlformats.org/officeDocument/2006/relationships" xmlns:p="http://schemas.openxmlformats.org/presentationml/2006/main">
   <p:cSld>
+    <p:bg>
+      <p:bgPr>
+        <a:solidFill>
+          <a:schemeClr val="bg1"/>
+        </a:solidFill>
+        <a:effectLst/>
+      </p:bgPr>
+    </p:bg>
     <p:spTree>
       <p:nvGrpSpPr>
         <p:cNvPr id="1" name=""/>
@@ -8484,51 +8450,39 @@
           <a:chExt cx="0" cy="0"/>
         </a:xfrm>
       </p:grpSpPr>
-      <p:sp>
-        <p:nvSpPr>
-          <p:cNvPr id="2" name="Title 1"/>
-          <p:cNvSpPr>
-            <a:spLocks noGrp="1"/>
-          </p:cNvSpPr>
-          <p:nvPr>
-            <p:ph type="title"/>
-          </p:nvPr>
-        </p:nvSpPr>
-        <p:spPr/>
-        <p:txBody>
-          <a:bodyPr/>
-          <a:lstStyle/>
-          <a:p>
-            <a:r>
-              <a:rPr lang="en-US" dirty="0"/>
-              <a:t>GRASP Implementation</a:t>
-            </a:r>
-          </a:p>
-        </p:txBody>
-      </p:sp>
-      <p:sp>
-        <p:nvSpPr>
-          <p:cNvPr id="3" name="Content Placeholder 2"/>
-          <p:cNvSpPr>
-            <a:spLocks noGrp="1"/>
-          </p:cNvSpPr>
-          <p:nvPr>
-            <p:ph idx="1"/>
-          </p:nvPr>
-        </p:nvSpPr>
-        <p:spPr/>
-        <p:txBody>
-          <a:bodyPr/>
-          <a:lstStyle/>
-          <a:p>
-            <a:endParaRPr lang="en-US" dirty="0"/>
-          </a:p>
-        </p:txBody>
-      </p:sp>
+      <p:pic>
+        <p:nvPicPr>
+          <p:cNvPr id="8" name="Picture 7">
+            <a:extLst>
+              <a:ext uri="{FF2B5EF4-FFF2-40B4-BE49-F238E27FC236}">
+                <a16:creationId xmlns:a16="http://schemas.microsoft.com/office/drawing/2014/main" id="{1E5D169B-81B0-47E6-B8BE-9F9F45E65385}"/>
+              </a:ext>
+            </a:extLst>
+          </p:cNvPr>
+          <p:cNvPicPr>
+            <a:picLocks noChangeAspect="1"/>
+          </p:cNvPicPr>
+          <p:nvPr/>
+        </p:nvPicPr>
+        <p:blipFill rotWithShape="1">
+          <a:blip r:embed="rId2"/>
+          <a:srcRect l="1677" t="26154" r="81238" b="37643"/>
+          <a:stretch/>
+        </p:blipFill>
+        <p:spPr>
+          <a:xfrm>
+            <a:off x="3777996" y="45418"/>
+            <a:ext cx="4636008" cy="6767164"/>
+          </a:xfrm>
+          <a:prstGeom prst="rect">
+            <a:avLst/>
+          </a:prstGeom>
+        </p:spPr>
+      </p:pic>
     </p:spTree>
     <p:extLst>
       <p:ext uri="{BB962C8B-B14F-4D97-AF65-F5344CB8AC3E}">
-        <p14:creationId xmlns:p14="http://schemas.microsoft.com/office/powerpoint/2010/main" val="3874524072"/>
+        <p14:creationId xmlns:p14="http://schemas.microsoft.com/office/powerpoint/2010/main" val="1841823404"/>
       </p:ext>
     </p:extLst>
   </p:cSld>
@@ -8541,6 +8495,14 @@
 <file path=ppt/slides/slide9.xml><?xml version="1.0" encoding="utf-8"?>
 <p:sld xmlns:a="http://schemas.openxmlformats.org/drawingml/2006/main" xmlns:r="http://schemas.openxmlformats.org/officeDocument/2006/relationships" xmlns:p="http://schemas.openxmlformats.org/presentationml/2006/main">
   <p:cSld>
+    <p:bg>
+      <p:bgPr>
+        <a:solidFill>
+          <a:schemeClr val="bg1"/>
+        </a:solidFill>
+        <a:effectLst/>
+      </p:bgPr>
+    </p:bg>
     <p:spTree>
       <p:nvGrpSpPr>
         <p:cNvPr id="1" name=""/>
@@ -8555,43 +8517,19 @@
           <a:chExt cx="0" cy="0"/>
         </a:xfrm>
       </p:grpSpPr>
-      <p:sp>
-        <p:nvSpPr>
-          <p:cNvPr id="2" name="Title 1"/>
-          <p:cNvSpPr>
-            <a:spLocks noGrp="1"/>
-          </p:cNvSpPr>
-          <p:nvPr>
-            <p:ph type="title"/>
-          </p:nvPr>
-        </p:nvSpPr>
-        <p:spPr/>
-        <p:txBody>
-          <a:bodyPr/>
-          <a:lstStyle/>
-          <a:p>
-            <a:r>
-              <a:rPr lang="en-US" dirty="0"/>
-              <a:t>Test Coverage Summary</a:t>
-            </a:r>
-          </a:p>
-        </p:txBody>
-      </p:sp>
       <p:pic>
         <p:nvPicPr>
-          <p:cNvPr id="5" name="Content Placeholder 4">
+          <p:cNvPr id="2" name="Picture 1">
             <a:extLst>
               <a:ext uri="{FF2B5EF4-FFF2-40B4-BE49-F238E27FC236}">
-                <a16:creationId xmlns:a16="http://schemas.microsoft.com/office/drawing/2014/main" id="{463BBECE-63EA-4E92-A624-A30212038ED6}"/>
+                <a16:creationId xmlns:a16="http://schemas.microsoft.com/office/drawing/2014/main" id="{03728557-9243-4352-9181-97A3B3BF84E5}"/>
               </a:ext>
             </a:extLst>
           </p:cNvPr>
           <p:cNvPicPr>
-            <a:picLocks noGrp="1" noChangeAspect="1"/>
+            <a:picLocks noChangeAspect="1"/>
           </p:cNvPicPr>
-          <p:nvPr>
-            <p:ph idx="1"/>
-          </p:nvPr>
+          <p:nvPr/>
         </p:nvPicPr>
         <p:blipFill>
           <a:blip r:embed="rId2"/>
@@ -8601,15 +8539,18 @@
         </p:blipFill>
         <p:spPr>
           <a:xfrm>
-            <a:off x="271698" y="2193873"/>
-            <a:ext cx="11648604" cy="4076228"/>
-          </a:xfrm>
+            <a:off x="2904807" y="188409"/>
+            <a:ext cx="6382386" cy="6481182"/>
+          </a:xfrm>
+          <a:prstGeom prst="rect">
+            <a:avLst/>
+          </a:prstGeom>
         </p:spPr>
       </p:pic>
     </p:spTree>
     <p:extLst>
       <p:ext uri="{BB962C8B-B14F-4D97-AF65-F5344CB8AC3E}">
-        <p14:creationId xmlns:p14="http://schemas.microsoft.com/office/powerpoint/2010/main" val="3884952505"/>
+        <p14:creationId xmlns:p14="http://schemas.microsoft.com/office/powerpoint/2010/main" val="3996885469"/>
       </p:ext>
     </p:extLst>
   </p:cSld>

</xml_diff>